<commit_message>
update wireless triangle to use points
</commit_message>
<xml_diff>
--- a/intro to ble.pptx
+++ b/intro to ble.pptx
@@ -244,7 +244,7 @@
           <a:p>
             <a:fld id="{CB69E15D-2E95-428C-B9E3-27B2BF3879D0}" type="datetimeFigureOut">
               <a:rPr lang="en-SG" smtClean="0"/>
-              <a:t>16/2/16</a:t>
+              <a:t>17/2/2016</a:t>
             </a:fld>
             <a:endParaRPr lang="en-SG"/>
           </a:p>
@@ -811,7 +811,7 @@
           <a:p>
             <a:fld id="{14C94871-C4DF-4AFD-96E5-87B050A67E05}" type="datetime1">
               <a:rPr lang="en-SG" smtClean="0"/>
-              <a:t>16/2/16</a:t>
+              <a:t>17/2/2016</a:t>
             </a:fld>
             <a:endParaRPr lang="en-SG"/>
           </a:p>
@@ -981,7 +981,7 @@
           <a:p>
             <a:fld id="{76A6DE21-0D8F-4C8C-AF6A-521466B16426}" type="datetime1">
               <a:rPr lang="en-SG" smtClean="0"/>
-              <a:t>16/2/16</a:t>
+              <a:t>17/2/2016</a:t>
             </a:fld>
             <a:endParaRPr lang="en-SG"/>
           </a:p>
@@ -1161,7 +1161,7 @@
           <a:p>
             <a:fld id="{16A18ED7-72CF-4BB2-8941-928963568089}" type="datetime1">
               <a:rPr lang="en-SG" smtClean="0"/>
-              <a:t>16/2/16</a:t>
+              <a:t>17/2/2016</a:t>
             </a:fld>
             <a:endParaRPr lang="en-SG"/>
           </a:p>
@@ -1331,7 +1331,7 @@
           <a:p>
             <a:fld id="{7FD7CD52-9833-4DD5-89FF-33E59F171421}" type="datetime1">
               <a:rPr lang="en-SG" smtClean="0"/>
-              <a:t>16/2/16</a:t>
+              <a:t>17/2/2016</a:t>
             </a:fld>
             <a:endParaRPr lang="en-SG"/>
           </a:p>
@@ -1575,7 +1575,7 @@
           <a:p>
             <a:fld id="{E74C9598-7F32-4DE4-BFF0-39C051013B34}" type="datetime1">
               <a:rPr lang="en-SG" smtClean="0"/>
-              <a:t>16/2/16</a:t>
+              <a:t>17/2/2016</a:t>
             </a:fld>
             <a:endParaRPr lang="en-SG"/>
           </a:p>
@@ -1807,7 +1807,7 @@
           <a:p>
             <a:fld id="{5DC821E8-33B0-41D5-8FA5-9A647E53891C}" type="datetime1">
               <a:rPr lang="en-SG" smtClean="0"/>
-              <a:t>16/2/16</a:t>
+              <a:t>17/2/2016</a:t>
             </a:fld>
             <a:endParaRPr lang="en-SG"/>
           </a:p>
@@ -2174,7 +2174,7 @@
           <a:p>
             <a:fld id="{751CCC62-50F5-4228-8D51-6D258C0BFCBD}" type="datetime1">
               <a:rPr lang="en-SG" smtClean="0"/>
-              <a:t>16/2/16</a:t>
+              <a:t>17/2/2016</a:t>
             </a:fld>
             <a:endParaRPr lang="en-SG"/>
           </a:p>
@@ -2292,7 +2292,7 @@
           <a:p>
             <a:fld id="{776807E8-5434-437A-A610-A94C24A73164}" type="datetime1">
               <a:rPr lang="en-SG" smtClean="0"/>
-              <a:t>16/2/16</a:t>
+              <a:t>17/2/2016</a:t>
             </a:fld>
             <a:endParaRPr lang="en-SG"/>
           </a:p>
@@ -2387,7 +2387,7 @@
           <a:p>
             <a:fld id="{18AC243E-E412-41F8-A99C-62E3D2C4FD1E}" type="datetime1">
               <a:rPr lang="en-SG" smtClean="0"/>
-              <a:t>16/2/16</a:t>
+              <a:t>17/2/2016</a:t>
             </a:fld>
             <a:endParaRPr lang="en-SG"/>
           </a:p>
@@ -2664,7 +2664,7 @@
           <a:p>
             <a:fld id="{30DD06DC-63F5-45CF-A3A5-F437A0C7E12A}" type="datetime1">
               <a:rPr lang="en-SG" smtClean="0"/>
-              <a:t>16/2/16</a:t>
+              <a:t>17/2/2016</a:t>
             </a:fld>
             <a:endParaRPr lang="en-SG"/>
           </a:p>
@@ -2921,7 +2921,7 @@
           <a:p>
             <a:fld id="{7810AE82-8C34-472D-B90B-4D50508F585C}" type="datetime1">
               <a:rPr lang="en-SG" smtClean="0"/>
-              <a:t>16/2/16</a:t>
+              <a:t>17/2/2016</a:t>
             </a:fld>
             <a:endParaRPr lang="en-SG"/>
           </a:p>
@@ -3134,7 +3134,7 @@
           <a:p>
             <a:fld id="{393BD624-3486-430E-A0CD-3F2C92C8E573}" type="datetime1">
               <a:rPr lang="en-SG" smtClean="0"/>
-              <a:t>16/2/16</a:t>
+              <a:t>17/2/2016</a:t>
             </a:fld>
             <a:endParaRPr lang="en-SG"/>
           </a:p>
@@ -4170,13 +4170,6 @@
   <p:clrMapOvr>
     <a:masterClrMapping/>
   </p:clrMapOvr>
-  <p:timing>
-    <p:tnLst>
-      <p:par>
-        <p:cTn id="1" dur="indefinite" restart="never" nodeType="tmRoot"/>
-      </p:par>
-    </p:tnLst>
-  </p:timing>
 </p:sld>
 </file>
 
@@ -5575,14 +5568,14 @@
                 <a:gridCol w="3368099">
                   <a:extLst>
                     <a:ext uri="{9D8B030D-6E8A-4147-A177-3AD203B41FA5}">
-                      <a16:colId xmlns:a16="http://schemas.microsoft.com/office/drawing/2014/main" xmlns="" val="20000"/>
+                      <a16:colId xmlns:a16="http://schemas.microsoft.com/office/drawing/2014/main" val="20000"/>
                     </a:ext>
                   </a:extLst>
                 </a:gridCol>
                 <a:gridCol w="5174322">
                   <a:extLst>
                     <a:ext uri="{9D8B030D-6E8A-4147-A177-3AD203B41FA5}">
-                      <a16:colId xmlns:a16="http://schemas.microsoft.com/office/drawing/2014/main" xmlns="" val="20001"/>
+                      <a16:colId xmlns:a16="http://schemas.microsoft.com/office/drawing/2014/main" val="20001"/>
                     </a:ext>
                   </a:extLst>
                 </a:gridCol>
@@ -5622,7 +5615,7 @@
                 </a:tc>
                 <a:extLst>
                   <a:ext uri="{0D108BD9-81ED-4DB2-BD59-A6C34878D82A}">
-                    <a16:rowId xmlns:a16="http://schemas.microsoft.com/office/drawing/2014/main" xmlns="" val="10000"/>
+                    <a16:rowId xmlns:a16="http://schemas.microsoft.com/office/drawing/2014/main" val="10000"/>
                   </a:ext>
                 </a:extLst>
               </a:tr>
@@ -5657,7 +5650,7 @@
                 </a:tc>
                 <a:extLst>
                   <a:ext uri="{0D108BD9-81ED-4DB2-BD59-A6C34878D82A}">
-                    <a16:rowId xmlns:a16="http://schemas.microsoft.com/office/drawing/2014/main" xmlns="" val="10001"/>
+                    <a16:rowId xmlns:a16="http://schemas.microsoft.com/office/drawing/2014/main" val="10001"/>
                   </a:ext>
                 </a:extLst>
               </a:tr>
@@ -5692,7 +5685,7 @@
                 </a:tc>
                 <a:extLst>
                   <a:ext uri="{0D108BD9-81ED-4DB2-BD59-A6C34878D82A}">
-                    <a16:rowId xmlns:a16="http://schemas.microsoft.com/office/drawing/2014/main" xmlns="" val="10002"/>
+                    <a16:rowId xmlns:a16="http://schemas.microsoft.com/office/drawing/2014/main" val="10002"/>
                   </a:ext>
                 </a:extLst>
               </a:tr>
@@ -5727,7 +5720,7 @@
                 </a:tc>
                 <a:extLst>
                   <a:ext uri="{0D108BD9-81ED-4DB2-BD59-A6C34878D82A}">
-                    <a16:rowId xmlns:a16="http://schemas.microsoft.com/office/drawing/2014/main" xmlns="" val="10003"/>
+                    <a16:rowId xmlns:a16="http://schemas.microsoft.com/office/drawing/2014/main" val="10003"/>
                   </a:ext>
                 </a:extLst>
               </a:tr>
@@ -6040,14 +6033,14 @@
                 <a:gridCol w="4184649">
                   <a:extLst>
                     <a:ext uri="{9D8B030D-6E8A-4147-A177-3AD203B41FA5}">
-                      <a16:colId xmlns:a16="http://schemas.microsoft.com/office/drawing/2014/main" xmlns="" val="20000"/>
+                      <a16:colId xmlns:a16="http://schemas.microsoft.com/office/drawing/2014/main" val="20000"/>
                     </a:ext>
                   </a:extLst>
                 </a:gridCol>
                 <a:gridCol w="4184649">
                   <a:extLst>
                     <a:ext uri="{9D8B030D-6E8A-4147-A177-3AD203B41FA5}">
-                      <a16:colId xmlns:a16="http://schemas.microsoft.com/office/drawing/2014/main" xmlns="" val="20001"/>
+                      <a16:colId xmlns:a16="http://schemas.microsoft.com/office/drawing/2014/main" val="20001"/>
                     </a:ext>
                   </a:extLst>
                 </a:gridCol>
@@ -6089,7 +6082,7 @@
                 </a:tc>
                 <a:extLst>
                   <a:ext uri="{0D108BD9-81ED-4DB2-BD59-A6C34878D82A}">
-                    <a16:rowId xmlns:a16="http://schemas.microsoft.com/office/drawing/2014/main" xmlns="" val="10000"/>
+                    <a16:rowId xmlns:a16="http://schemas.microsoft.com/office/drawing/2014/main" val="10000"/>
                   </a:ext>
                 </a:extLst>
               </a:tr>
@@ -6619,7 +6612,7 @@
                 </a:tc>
                 <a:extLst>
                   <a:ext uri="{0D108BD9-81ED-4DB2-BD59-A6C34878D82A}">
-                    <a16:rowId xmlns:a16="http://schemas.microsoft.com/office/drawing/2014/main" xmlns="" val="10001"/>
+                    <a16:rowId xmlns:a16="http://schemas.microsoft.com/office/drawing/2014/main" val="10001"/>
                   </a:ext>
                 </a:extLst>
               </a:tr>
@@ -14772,14 +14765,14 @@
                 <a:gridCol w="2702014">
                   <a:extLst>
                     <a:ext uri="{9D8B030D-6E8A-4147-A177-3AD203B41FA5}">
-                      <a16:colId xmlns:a16="http://schemas.microsoft.com/office/drawing/2014/main" xmlns="" val="20000"/>
+                      <a16:colId xmlns:a16="http://schemas.microsoft.com/office/drawing/2014/main" val="20000"/>
                     </a:ext>
                   </a:extLst>
                 </a:gridCol>
                 <a:gridCol w="6095637">
                   <a:extLst>
                     <a:ext uri="{9D8B030D-6E8A-4147-A177-3AD203B41FA5}">
-                      <a16:colId xmlns:a16="http://schemas.microsoft.com/office/drawing/2014/main" xmlns="" val="20001"/>
+                      <a16:colId xmlns:a16="http://schemas.microsoft.com/office/drawing/2014/main" val="20001"/>
                     </a:ext>
                   </a:extLst>
                 </a:gridCol>
@@ -14827,7 +14820,7 @@
                 </a:tc>
                 <a:extLst>
                   <a:ext uri="{0D108BD9-81ED-4DB2-BD59-A6C34878D82A}">
-                    <a16:rowId xmlns:a16="http://schemas.microsoft.com/office/drawing/2014/main" xmlns="" val="10000"/>
+                    <a16:rowId xmlns:a16="http://schemas.microsoft.com/office/drawing/2014/main" val="10000"/>
                   </a:ext>
                 </a:extLst>
               </a:tr>
@@ -14870,7 +14863,7 @@
                 </a:tc>
                 <a:extLst>
                   <a:ext uri="{0D108BD9-81ED-4DB2-BD59-A6C34878D82A}">
-                    <a16:rowId xmlns:a16="http://schemas.microsoft.com/office/drawing/2014/main" xmlns="" val="10001"/>
+                    <a16:rowId xmlns:a16="http://schemas.microsoft.com/office/drawing/2014/main" val="10001"/>
                   </a:ext>
                 </a:extLst>
               </a:tr>
@@ -14921,7 +14914,7 @@
                 </a:tc>
                 <a:extLst>
                   <a:ext uri="{0D108BD9-81ED-4DB2-BD59-A6C34878D82A}">
-                    <a16:rowId xmlns:a16="http://schemas.microsoft.com/office/drawing/2014/main" xmlns="" val="10002"/>
+                    <a16:rowId xmlns:a16="http://schemas.microsoft.com/office/drawing/2014/main" val="10002"/>
                   </a:ext>
                 </a:extLst>
               </a:tr>
@@ -14956,7 +14949,7 @@
                 </a:tc>
                 <a:extLst>
                   <a:ext uri="{0D108BD9-81ED-4DB2-BD59-A6C34878D82A}">
-                    <a16:rowId xmlns:a16="http://schemas.microsoft.com/office/drawing/2014/main" xmlns="" val="10003"/>
+                    <a16:rowId xmlns:a16="http://schemas.microsoft.com/office/drawing/2014/main" val="10003"/>
                   </a:ext>
                 </a:extLst>
               </a:tr>
@@ -15007,7 +15000,7 @@
                 </a:tc>
                 <a:extLst>
                   <a:ext uri="{0D108BD9-81ED-4DB2-BD59-A6C34878D82A}">
-                    <a16:rowId xmlns:a16="http://schemas.microsoft.com/office/drawing/2014/main" xmlns="" val="10004"/>
+                    <a16:rowId xmlns:a16="http://schemas.microsoft.com/office/drawing/2014/main" val="10004"/>
                   </a:ext>
                 </a:extLst>
               </a:tr>
@@ -17796,11 +17789,7 @@
             <a:pPr lvl="1"/>
             <a:r>
               <a:rPr lang="en-SG" dirty="0" smtClean="0"/>
-              <a:t>~20 (online anecdotes</a:t>
-            </a:r>
-            <a:r>
-              <a:rPr lang="en-SG" dirty="0" smtClean="0"/>
-              <a:t>)</a:t>
+              <a:t>~20 (online anecdotes)</a:t>
             </a:r>
           </a:p>
           <a:p>
@@ -19604,21 +19593,8 @@
             <a:pPr lvl="1"/>
             <a:r>
               <a:rPr lang="en-SG" dirty="0" smtClean="0"/>
-              <a:t>Some phones filter advertisement results, some phones do not. </a:t>
-            </a:r>
-            <a:r>
-              <a:rPr lang="en-SG" dirty="0" smtClean="0"/>
-              <a:t>(usually on 4.3 </a:t>
-            </a:r>
-            <a:r>
-              <a:rPr lang="en-SG" dirty="0" smtClean="0"/>
-              <a:t>and </a:t>
-            </a:r>
-            <a:r>
-              <a:rPr lang="en-SG" dirty="0" smtClean="0"/>
-              <a:t>4.4)</a:t>
-            </a:r>
-            <a:endParaRPr lang="en-SG" dirty="0" smtClean="0"/>
+              <a:t>Some phones filter advertisement results, some phones do not. (usually on 4.3 and 4.4)</a:t>
+            </a:r>
           </a:p>
           <a:p>
             <a:pPr marL="514350" indent="-514350">
@@ -22680,49 +22656,49 @@
                 <a:gridCol w="1126671">
                   <a:extLst>
                     <a:ext uri="{9D8B030D-6E8A-4147-A177-3AD203B41FA5}">
-                      <a16:colId xmlns:a16="http://schemas.microsoft.com/office/drawing/2014/main" xmlns="" val="20000"/>
+                      <a16:colId xmlns:a16="http://schemas.microsoft.com/office/drawing/2014/main" val="20000"/>
                     </a:ext>
                   </a:extLst>
                 </a:gridCol>
                 <a:gridCol w="1091118">
                   <a:extLst>
                     <a:ext uri="{9D8B030D-6E8A-4147-A177-3AD203B41FA5}">
-                      <a16:colId xmlns:a16="http://schemas.microsoft.com/office/drawing/2014/main" xmlns="" val="20001"/>
+                      <a16:colId xmlns:a16="http://schemas.microsoft.com/office/drawing/2014/main" val="20001"/>
                     </a:ext>
                   </a:extLst>
                 </a:gridCol>
                 <a:gridCol w="1423219">
                   <a:extLst>
                     <a:ext uri="{9D8B030D-6E8A-4147-A177-3AD203B41FA5}">
-                      <a16:colId xmlns:a16="http://schemas.microsoft.com/office/drawing/2014/main" xmlns="" val="20002"/>
+                      <a16:colId xmlns:a16="http://schemas.microsoft.com/office/drawing/2014/main" val="20002"/>
                     </a:ext>
                   </a:extLst>
                 </a:gridCol>
                 <a:gridCol w="671052">
                   <a:extLst>
                     <a:ext uri="{9D8B030D-6E8A-4147-A177-3AD203B41FA5}">
-                      <a16:colId xmlns:a16="http://schemas.microsoft.com/office/drawing/2014/main" xmlns="" val="20003"/>
+                      <a16:colId xmlns:a16="http://schemas.microsoft.com/office/drawing/2014/main" val="20003"/>
                     </a:ext>
                   </a:extLst>
                 </a:gridCol>
                 <a:gridCol w="648929">
                   <a:extLst>
                     <a:ext uri="{9D8B030D-6E8A-4147-A177-3AD203B41FA5}">
-                      <a16:colId xmlns:a16="http://schemas.microsoft.com/office/drawing/2014/main" xmlns="" val="20004"/>
+                      <a16:colId xmlns:a16="http://schemas.microsoft.com/office/drawing/2014/main" val="20004"/>
                     </a:ext>
                   </a:extLst>
                 </a:gridCol>
                 <a:gridCol w="1939413">
                   <a:extLst>
                     <a:ext uri="{9D8B030D-6E8A-4147-A177-3AD203B41FA5}">
-                      <a16:colId xmlns:a16="http://schemas.microsoft.com/office/drawing/2014/main" xmlns="" val="20005"/>
+                      <a16:colId xmlns:a16="http://schemas.microsoft.com/office/drawing/2014/main" val="20005"/>
                     </a:ext>
                   </a:extLst>
                 </a:gridCol>
                 <a:gridCol w="986295">
                   <a:extLst>
                     <a:ext uri="{9D8B030D-6E8A-4147-A177-3AD203B41FA5}">
-                      <a16:colId xmlns:a16="http://schemas.microsoft.com/office/drawing/2014/main" xmlns="" val="20006"/>
+                      <a16:colId xmlns:a16="http://schemas.microsoft.com/office/drawing/2014/main" val="20006"/>
                     </a:ext>
                   </a:extLst>
                 </a:gridCol>
@@ -22836,7 +22812,7 @@
                 </a:tc>
                 <a:extLst>
                   <a:ext uri="{0D108BD9-81ED-4DB2-BD59-A6C34878D82A}">
-                    <a16:rowId xmlns:a16="http://schemas.microsoft.com/office/drawing/2014/main" xmlns="" val="10000"/>
+                    <a16:rowId xmlns:a16="http://schemas.microsoft.com/office/drawing/2014/main" val="10000"/>
                   </a:ext>
                 </a:extLst>
               </a:tr>
@@ -22974,7 +22950,7 @@
                 </a:tc>
                 <a:extLst>
                   <a:ext uri="{0D108BD9-81ED-4DB2-BD59-A6C34878D82A}">
-                    <a16:rowId xmlns:a16="http://schemas.microsoft.com/office/drawing/2014/main" xmlns="" val="10001"/>
+                    <a16:rowId xmlns:a16="http://schemas.microsoft.com/office/drawing/2014/main" val="10001"/>
                   </a:ext>
                 </a:extLst>
               </a:tr>
@@ -33218,13 +33194,6 @@
   <p:clrMapOvr>
     <a:masterClrMapping/>
   </p:clrMapOvr>
-  <p:timing>
-    <p:tnLst>
-      <p:par>
-        <p:cTn id="1" dur="indefinite" restart="never" nodeType="tmRoot"/>
-      </p:par>
-    </p:tnLst>
-  </p:timing>
 </p:sld>
 </file>
 
@@ -33491,228 +33460,6 @@
       </p:sp>
       <p:sp>
         <p:nvSpPr>
-          <p:cNvPr id="5" name="Isosceles Triangle 4"/>
-          <p:cNvSpPr/>
-          <p:nvPr/>
-        </p:nvSpPr>
-        <p:spPr>
-          <a:xfrm rot="10800000">
-            <a:off x="4148402" y="593849"/>
-            <a:ext cx="3815247" cy="1366594"/>
-          </a:xfrm>
-          <a:prstGeom prst="triangle">
-            <a:avLst>
-              <a:gd name="adj" fmla="val 50471"/>
-            </a:avLst>
-          </a:prstGeom>
-          <a:noFill/>
-          <a:ln>
-            <a:solidFill>
-              <a:srgbClr val="C00000"/>
-            </a:solidFill>
-          </a:ln>
-        </p:spPr>
-        <p:style>
-          <a:lnRef idx="2">
-            <a:schemeClr val="accent1"/>
-          </a:lnRef>
-          <a:fillRef idx="1">
-            <a:schemeClr val="lt1"/>
-          </a:fillRef>
-          <a:effectRef idx="0">
-            <a:schemeClr val="accent1"/>
-          </a:effectRef>
-          <a:fontRef idx="minor">
-            <a:schemeClr val="dk1"/>
-          </a:fontRef>
-        </p:style>
-        <p:txBody>
-          <a:bodyPr rtlCol="0" anchor="t" anchorCtr="0">
-            <a:scene3d>
-              <a:camera prst="orthographicFront">
-                <a:rot lat="0" lon="0" rev="10800000"/>
-              </a:camera>
-              <a:lightRig rig="threePt" dir="t"/>
-            </a:scene3d>
-          </a:bodyPr>
-          <a:lstStyle/>
-          <a:p>
-            <a:pPr algn="ctr"/>
-            <a:r>
-              <a:rPr lang="en-SG" dirty="0" smtClean="0">
-                <a:solidFill>
-                  <a:srgbClr val="C00000"/>
-                </a:solidFill>
-              </a:rPr>
-              <a:t>3G/4G</a:t>
-            </a:r>
-            <a:endParaRPr lang="en-SG" dirty="0">
-              <a:solidFill>
-                <a:srgbClr val="C00000"/>
-              </a:solidFill>
-            </a:endParaRPr>
-          </a:p>
-        </p:txBody>
-      </p:sp>
-      <p:sp>
-        <p:nvSpPr>
-          <p:cNvPr id="23" name="Isosceles Triangle 22"/>
-          <p:cNvSpPr/>
-          <p:nvPr/>
-        </p:nvSpPr>
-        <p:spPr>
-          <a:xfrm rot="10800000">
-            <a:off x="2820909" y="2175261"/>
-            <a:ext cx="3539524" cy="1074248"/>
-          </a:xfrm>
-          <a:prstGeom prst="triangle">
-            <a:avLst>
-              <a:gd name="adj" fmla="val 50328"/>
-            </a:avLst>
-          </a:prstGeom>
-          <a:noFill/>
-          <a:ln>
-            <a:solidFill>
-              <a:srgbClr val="FFC000"/>
-            </a:solidFill>
-          </a:ln>
-        </p:spPr>
-        <p:style>
-          <a:lnRef idx="2">
-            <a:schemeClr val="accent1"/>
-          </a:lnRef>
-          <a:fillRef idx="1">
-            <a:schemeClr val="lt1"/>
-          </a:fillRef>
-          <a:effectRef idx="0">
-            <a:schemeClr val="accent1"/>
-          </a:effectRef>
-          <a:fontRef idx="minor">
-            <a:schemeClr val="dk1"/>
-          </a:fontRef>
-        </p:style>
-        <p:txBody>
-          <a:bodyPr rtlCol="0" anchor="ctr"/>
-          <a:lstStyle/>
-          <a:p>
-            <a:pPr algn="ctr"/>
-            <a:endParaRPr lang="en-SG" sz="2000" dirty="0"/>
-          </a:p>
-        </p:txBody>
-      </p:sp>
-      <p:sp>
-        <p:nvSpPr>
-          <p:cNvPr id="26" name="Isosceles Triangle 25"/>
-          <p:cNvSpPr/>
-          <p:nvPr/>
-        </p:nvSpPr>
-        <p:spPr>
-          <a:xfrm rot="10800000">
-            <a:off x="2010223" y="2174705"/>
-            <a:ext cx="3492047" cy="1074248"/>
-          </a:xfrm>
-          <a:prstGeom prst="triangle">
-            <a:avLst>
-              <a:gd name="adj" fmla="val 50328"/>
-            </a:avLst>
-          </a:prstGeom>
-          <a:noFill/>
-          <a:ln>
-            <a:solidFill>
-              <a:srgbClr val="002060"/>
-            </a:solidFill>
-          </a:ln>
-        </p:spPr>
-        <p:style>
-          <a:lnRef idx="2">
-            <a:schemeClr val="accent1"/>
-          </a:lnRef>
-          <a:fillRef idx="1">
-            <a:schemeClr val="lt1"/>
-          </a:fillRef>
-          <a:effectRef idx="0">
-            <a:schemeClr val="accent1"/>
-          </a:effectRef>
-          <a:fontRef idx="minor">
-            <a:schemeClr val="dk1"/>
-          </a:fontRef>
-        </p:style>
-        <p:txBody>
-          <a:bodyPr rtlCol="0" anchor="ctr"/>
-          <a:lstStyle/>
-          <a:p>
-            <a:pPr algn="ctr"/>
-            <a:endParaRPr lang="en-SG" dirty="0"/>
-          </a:p>
-        </p:txBody>
-      </p:sp>
-      <p:sp>
-        <p:nvSpPr>
-          <p:cNvPr id="28" name="Isosceles Triangle 27"/>
-          <p:cNvSpPr/>
-          <p:nvPr/>
-        </p:nvSpPr>
-        <p:spPr>
-          <a:xfrm rot="10800000">
-            <a:off x="4148402" y="5910016"/>
-            <a:ext cx="837225" cy="541168"/>
-          </a:xfrm>
-          <a:prstGeom prst="triangle">
-            <a:avLst>
-              <a:gd name="adj" fmla="val 50328"/>
-            </a:avLst>
-          </a:prstGeom>
-          <a:noFill/>
-          <a:ln>
-            <a:solidFill>
-              <a:schemeClr val="accent2"/>
-            </a:solidFill>
-          </a:ln>
-        </p:spPr>
-        <p:style>
-          <a:lnRef idx="2">
-            <a:schemeClr val="accent1"/>
-          </a:lnRef>
-          <a:fillRef idx="1">
-            <a:schemeClr val="lt1"/>
-          </a:fillRef>
-          <a:effectRef idx="0">
-            <a:schemeClr val="accent1"/>
-          </a:effectRef>
-          <a:fontRef idx="minor">
-            <a:schemeClr val="dk1"/>
-          </a:fontRef>
-        </p:style>
-        <p:txBody>
-          <a:bodyPr rtlCol="0" anchor="b" anchorCtr="0">
-            <a:scene3d>
-              <a:camera prst="orthographicFront">
-                <a:rot lat="0" lon="0" rev="10800000"/>
-              </a:camera>
-              <a:lightRig rig="threePt" dir="t"/>
-            </a:scene3d>
-          </a:bodyPr>
-          <a:lstStyle/>
-          <a:p>
-            <a:pPr algn="ctr"/>
-            <a:r>
-              <a:rPr lang="en-SG" sz="900" dirty="0" smtClean="0">
-                <a:solidFill>
-                  <a:schemeClr val="accent2"/>
-                </a:solidFill>
-              </a:rPr>
-              <a:t>RFID/NFC</a:t>
-            </a:r>
-            <a:endParaRPr lang="en-SG" sz="900" dirty="0">
-              <a:solidFill>
-                <a:schemeClr val="accent2"/>
-              </a:solidFill>
-            </a:endParaRPr>
-          </a:p>
-        </p:txBody>
-      </p:sp>
-      <p:sp>
-        <p:nvSpPr>
           <p:cNvPr id="31" name="TextBox 30"/>
           <p:cNvSpPr txBox="1"/>
           <p:nvPr/>
@@ -33813,189 +33560,14 @@
       </p:sp>
       <p:sp>
         <p:nvSpPr>
-          <p:cNvPr id="32" name="Isosceles Triangle 31"/>
-          <p:cNvSpPr/>
-          <p:nvPr/>
-        </p:nvSpPr>
-        <p:spPr>
-          <a:xfrm rot="10800000">
-            <a:off x="4183192" y="3597550"/>
-            <a:ext cx="1872833" cy="1504810"/>
-          </a:xfrm>
-          <a:prstGeom prst="triangle">
-            <a:avLst>
-              <a:gd name="adj" fmla="val 50328"/>
-            </a:avLst>
-          </a:prstGeom>
-          <a:noFill/>
-          <a:ln>
-            <a:solidFill>
-              <a:srgbClr val="FF0000"/>
-            </a:solidFill>
-          </a:ln>
-        </p:spPr>
-        <p:style>
-          <a:lnRef idx="2">
-            <a:schemeClr val="accent1"/>
-          </a:lnRef>
-          <a:fillRef idx="1">
-            <a:schemeClr val="lt1"/>
-          </a:fillRef>
-          <a:effectRef idx="0">
-            <a:schemeClr val="accent1"/>
-          </a:effectRef>
-          <a:fontRef idx="minor">
-            <a:schemeClr val="dk1"/>
-          </a:fontRef>
-        </p:style>
-        <p:txBody>
-          <a:bodyPr rtlCol="0" anchor="ctr">
-            <a:scene3d>
-              <a:camera prst="orthographicFront">
-                <a:rot lat="0" lon="0" rev="10800000"/>
-              </a:camera>
-              <a:lightRig rig="threePt" dir="t"/>
-            </a:scene3d>
-          </a:bodyPr>
-          <a:lstStyle/>
-          <a:p>
-            <a:pPr algn="ctr"/>
-            <a:r>
-              <a:rPr lang="en-SG" dirty="0" err="1" smtClean="0">
-                <a:solidFill>
-                  <a:srgbClr val="FF0000"/>
-                </a:solidFill>
-              </a:rPr>
-              <a:t>Zigbee</a:t>
-            </a:r>
-            <a:endParaRPr lang="en-SG" dirty="0">
-              <a:solidFill>
-                <a:srgbClr val="FF0000"/>
-              </a:solidFill>
-            </a:endParaRPr>
-          </a:p>
-        </p:txBody>
-      </p:sp>
-      <p:sp>
-        <p:nvSpPr>
-          <p:cNvPr id="30" name="Isosceles Triangle 29"/>
-          <p:cNvSpPr/>
-          <p:nvPr/>
-        </p:nvSpPr>
-        <p:spPr>
-          <a:xfrm rot="10800000">
-            <a:off x="4546599" y="3601617"/>
-            <a:ext cx="933411" cy="2110272"/>
-          </a:xfrm>
-          <a:prstGeom prst="triangle">
-            <a:avLst>
-              <a:gd name="adj" fmla="val 50328"/>
-            </a:avLst>
-          </a:prstGeom>
-          <a:noFill/>
-          <a:ln>
-            <a:solidFill>
-              <a:srgbClr val="7030A0"/>
-            </a:solidFill>
-          </a:ln>
-        </p:spPr>
-        <p:style>
-          <a:lnRef idx="2">
-            <a:schemeClr val="accent1"/>
-          </a:lnRef>
-          <a:fillRef idx="1">
-            <a:schemeClr val="lt1"/>
-          </a:fillRef>
-          <a:effectRef idx="0">
-            <a:schemeClr val="accent1"/>
-          </a:effectRef>
-          <a:fontRef idx="minor">
-            <a:schemeClr val="dk1"/>
-          </a:fontRef>
-        </p:style>
-        <p:txBody>
-          <a:bodyPr rtlCol="0" anchor="ctr"/>
-          <a:lstStyle/>
-          <a:p>
-            <a:pPr algn="ctr"/>
-            <a:endParaRPr lang="en-SG" sz="1600" dirty="0">
-              <a:solidFill>
-                <a:srgbClr val="7030A0"/>
-              </a:solidFill>
-            </a:endParaRPr>
-          </a:p>
-        </p:txBody>
-      </p:sp>
-      <p:sp>
-        <p:nvSpPr>
-          <p:cNvPr id="29" name="Isosceles Triangle 28"/>
-          <p:cNvSpPr/>
-          <p:nvPr/>
-        </p:nvSpPr>
-        <p:spPr>
-          <a:xfrm rot="10800000">
-            <a:off x="3558065" y="3596975"/>
-            <a:ext cx="1930400" cy="966801"/>
-          </a:xfrm>
-          <a:prstGeom prst="triangle">
-            <a:avLst>
-              <a:gd name="adj" fmla="val 50328"/>
-            </a:avLst>
-          </a:prstGeom>
-          <a:noFill/>
-        </p:spPr>
-        <p:style>
-          <a:lnRef idx="2">
-            <a:schemeClr val="accent1"/>
-          </a:lnRef>
-          <a:fillRef idx="1">
-            <a:schemeClr val="lt1"/>
-          </a:fillRef>
-          <a:effectRef idx="0">
-            <a:schemeClr val="accent1"/>
-          </a:effectRef>
-          <a:fontRef idx="minor">
-            <a:schemeClr val="dk1"/>
-          </a:fontRef>
-        </p:style>
-        <p:txBody>
-          <a:bodyPr rtlCol="0" anchor="b" anchorCtr="0">
-            <a:scene3d>
-              <a:camera prst="orthographicFront">
-                <a:rot lat="0" lon="0" rev="10799999"/>
-              </a:camera>
-              <a:lightRig rig="threePt" dir="t"/>
-            </a:scene3d>
-          </a:bodyPr>
-          <a:lstStyle/>
-          <a:p>
-            <a:pPr algn="ctr"/>
-            <a:r>
-              <a:rPr lang="en-SG" sz="2000" dirty="0" smtClean="0">
-                <a:solidFill>
-                  <a:schemeClr val="accent1"/>
-                </a:solidFill>
-              </a:rPr>
-              <a:t>BT Classic</a:t>
-            </a:r>
-            <a:endParaRPr lang="en-SG" sz="2000" dirty="0">
-              <a:solidFill>
-                <a:schemeClr val="accent1"/>
-              </a:solidFill>
-            </a:endParaRPr>
-          </a:p>
-        </p:txBody>
-      </p:sp>
-      <p:sp>
-        <p:nvSpPr>
           <p:cNvPr id="6" name="TextBox 5"/>
           <p:cNvSpPr txBox="1"/>
           <p:nvPr/>
         </p:nvSpPr>
         <p:spPr>
           <a:xfrm>
-            <a:off x="2687831" y="2108338"/>
-            <a:ext cx="1296189" cy="646331"/>
+            <a:off x="2443406" y="2157882"/>
+            <a:ext cx="1170000" cy="584775"/>
           </a:xfrm>
           <a:prstGeom prst="rect">
             <a:avLst/>
@@ -34009,7 +33581,7 @@
           <a:lstStyle/>
           <a:p>
             <a:r>
-              <a:rPr lang="en-SG" dirty="0" smtClean="0">
+              <a:rPr lang="en-SG" sz="1600" dirty="0" smtClean="0">
                 <a:solidFill>
                   <a:srgbClr val="002060"/>
                 </a:solidFill>
@@ -34019,14 +33591,14 @@
           </a:p>
           <a:p>
             <a:r>
-              <a:rPr lang="en-SG" dirty="0" smtClean="0">
+              <a:rPr lang="en-SG" sz="1600" dirty="0" smtClean="0">
                 <a:solidFill>
                   <a:srgbClr val="002060"/>
                 </a:solidFill>
               </a:rPr>
               <a:t>5Ghz</a:t>
             </a:r>
-            <a:endParaRPr lang="en-SG" dirty="0">
+            <a:endParaRPr lang="en-SG" sz="1600" dirty="0">
               <a:solidFill>
                 <a:srgbClr val="002060"/>
               </a:solidFill>
@@ -34042,8 +33614,8 @@
         </p:nvSpPr>
         <p:spPr>
           <a:xfrm>
-            <a:off x="4655071" y="2158095"/>
-            <a:ext cx="1469698" cy="646331"/>
+            <a:off x="3566815" y="2154097"/>
+            <a:ext cx="1321772" cy="584775"/>
           </a:xfrm>
           <a:prstGeom prst="rect">
             <a:avLst/>
@@ -34057,14 +33629,14 @@
           <a:lstStyle/>
           <a:p>
             <a:r>
-              <a:rPr lang="en-SG" dirty="0">
+              <a:rPr lang="en-SG" sz="1600" dirty="0">
                 <a:solidFill>
                   <a:srgbClr val="FFC000"/>
                 </a:solidFill>
               </a:rPr>
               <a:t>802.11 b/g/n </a:t>
             </a:r>
-            <a:endParaRPr lang="en-SG" dirty="0" smtClean="0">
+            <a:endParaRPr lang="en-SG" sz="1600" dirty="0" smtClean="0">
               <a:solidFill>
                 <a:srgbClr val="FFC000"/>
               </a:solidFill>
@@ -34072,14 +33644,14 @@
           </a:p>
           <a:p>
             <a:r>
-              <a:rPr lang="en-SG" dirty="0" smtClean="0">
+              <a:rPr lang="en-SG" sz="1600" dirty="0" smtClean="0">
                 <a:solidFill>
                   <a:srgbClr val="FFC000"/>
                 </a:solidFill>
               </a:rPr>
               <a:t>2.4Ghz</a:t>
             </a:r>
-            <a:endParaRPr lang="en-SG" dirty="0">
+            <a:endParaRPr lang="en-SG" sz="1600" dirty="0">
               <a:solidFill>
                 <a:srgbClr val="FFC000"/>
               </a:solidFill>
@@ -34095,8 +33667,8 @@
         </p:nvSpPr>
         <p:spPr>
           <a:xfrm>
-            <a:off x="4445515" y="5057906"/>
-            <a:ext cx="519694" cy="369332"/>
+            <a:off x="4367886" y="4764818"/>
+            <a:ext cx="484428" cy="338554"/>
           </a:xfrm>
           <a:prstGeom prst="rect">
             <a:avLst/>
@@ -34110,18 +33682,501 @@
           <a:lstStyle/>
           <a:p>
             <a:r>
-              <a:rPr lang="en-SG" dirty="0" smtClean="0">
+              <a:rPr lang="en-SG" sz="1600" dirty="0" smtClean="0">
                 <a:solidFill>
                   <a:srgbClr val="7030A0"/>
                 </a:solidFill>
               </a:rPr>
               <a:t>BLE</a:t>
             </a:r>
-            <a:endParaRPr lang="en-SG" dirty="0">
+            <a:endParaRPr lang="en-SG" sz="1600" dirty="0">
               <a:solidFill>
                 <a:srgbClr val="7030A0"/>
               </a:solidFill>
             </a:endParaRPr>
+          </a:p>
+        </p:txBody>
+      </p:sp>
+      <p:sp>
+        <p:nvSpPr>
+          <p:cNvPr id="10" name="Oval 9"/>
+          <p:cNvSpPr/>
+          <p:nvPr/>
+        </p:nvSpPr>
+        <p:spPr>
+          <a:xfrm>
+            <a:off x="4489448" y="6118471"/>
+            <a:ext cx="114299" cy="114299"/>
+          </a:xfrm>
+          <a:prstGeom prst="ellipse">
+            <a:avLst/>
+          </a:prstGeom>
+          <a:solidFill>
+            <a:schemeClr val="accent2"/>
+          </a:solidFill>
+          <a:ln>
+            <a:solidFill>
+              <a:schemeClr val="accent2"/>
+            </a:solidFill>
+          </a:ln>
+        </p:spPr>
+        <p:style>
+          <a:lnRef idx="2">
+            <a:schemeClr val="accent1">
+              <a:shade val="50000"/>
+            </a:schemeClr>
+          </a:lnRef>
+          <a:fillRef idx="1">
+            <a:schemeClr val="accent1"/>
+          </a:fillRef>
+          <a:effectRef idx="0">
+            <a:schemeClr val="accent1"/>
+          </a:effectRef>
+          <a:fontRef idx="minor">
+            <a:schemeClr val="lt1"/>
+          </a:fontRef>
+        </p:style>
+        <p:txBody>
+          <a:bodyPr rtlCol="0" anchor="ctr"/>
+          <a:lstStyle/>
+          <a:p>
+            <a:pPr algn="ctr"/>
+            <a:endParaRPr lang="en-SG"/>
+          </a:p>
+        </p:txBody>
+      </p:sp>
+      <p:sp>
+        <p:nvSpPr>
+          <p:cNvPr id="13" name="TextBox 12"/>
+          <p:cNvSpPr txBox="1"/>
+          <p:nvPr/>
+        </p:nvSpPr>
+        <p:spPr>
+          <a:xfrm>
+            <a:off x="4067198" y="5686252"/>
+            <a:ext cx="1085983" cy="338554"/>
+          </a:xfrm>
+          <a:prstGeom prst="rect">
+            <a:avLst/>
+          </a:prstGeom>
+          <a:noFill/>
+        </p:spPr>
+        <p:txBody>
+          <a:bodyPr wrap="square" rtlCol="0">
+            <a:spAutoFit/>
+          </a:bodyPr>
+          <a:lstStyle/>
+          <a:p>
+            <a:r>
+              <a:rPr lang="en-SG" sz="1600" dirty="0" smtClean="0">
+                <a:solidFill>
+                  <a:schemeClr val="accent2"/>
+                </a:solidFill>
+              </a:rPr>
+              <a:t>RFID/NFC</a:t>
+            </a:r>
+            <a:endParaRPr lang="en-SG" sz="1600" dirty="0">
+              <a:solidFill>
+                <a:schemeClr val="accent2"/>
+              </a:solidFill>
+            </a:endParaRPr>
+          </a:p>
+        </p:txBody>
+      </p:sp>
+      <p:sp>
+        <p:nvSpPr>
+          <p:cNvPr id="22" name="Oval 21"/>
+          <p:cNvSpPr/>
+          <p:nvPr/>
+        </p:nvSpPr>
+        <p:spPr>
+          <a:xfrm>
+            <a:off x="7271064" y="668349"/>
+            <a:ext cx="114299" cy="114299"/>
+          </a:xfrm>
+          <a:prstGeom prst="ellipse">
+            <a:avLst/>
+          </a:prstGeom>
+          <a:solidFill>
+            <a:srgbClr val="C00000"/>
+          </a:solidFill>
+          <a:ln>
+            <a:solidFill>
+              <a:srgbClr val="C00000"/>
+            </a:solidFill>
+          </a:ln>
+        </p:spPr>
+        <p:style>
+          <a:lnRef idx="2">
+            <a:schemeClr val="accent1">
+              <a:shade val="50000"/>
+            </a:schemeClr>
+          </a:lnRef>
+          <a:fillRef idx="1">
+            <a:schemeClr val="accent1"/>
+          </a:fillRef>
+          <a:effectRef idx="0">
+            <a:schemeClr val="accent1"/>
+          </a:effectRef>
+          <a:fontRef idx="minor">
+            <a:schemeClr val="lt1"/>
+          </a:fontRef>
+        </p:style>
+        <p:txBody>
+          <a:bodyPr rtlCol="0" anchor="ctr"/>
+          <a:lstStyle/>
+          <a:p>
+            <a:pPr algn="ctr"/>
+            <a:endParaRPr lang="en-SG"/>
+          </a:p>
+        </p:txBody>
+      </p:sp>
+      <p:sp>
+        <p:nvSpPr>
+          <p:cNvPr id="14" name="TextBox 13"/>
+          <p:cNvSpPr txBox="1"/>
+          <p:nvPr/>
+        </p:nvSpPr>
+        <p:spPr>
+          <a:xfrm>
+            <a:off x="7010542" y="773378"/>
+            <a:ext cx="731290" cy="338554"/>
+          </a:xfrm>
+          <a:prstGeom prst="rect">
+            <a:avLst/>
+          </a:prstGeom>
+          <a:noFill/>
+        </p:spPr>
+        <p:txBody>
+          <a:bodyPr wrap="none" rtlCol="0">
+            <a:spAutoFit/>
+          </a:bodyPr>
+          <a:lstStyle/>
+          <a:p>
+            <a:r>
+              <a:rPr lang="en-SG" sz="1600" dirty="0" smtClean="0">
+                <a:solidFill>
+                  <a:srgbClr val="C00000"/>
+                </a:solidFill>
+              </a:rPr>
+              <a:t>3G/4G</a:t>
+            </a:r>
+          </a:p>
+        </p:txBody>
+      </p:sp>
+      <p:sp>
+        <p:nvSpPr>
+          <p:cNvPr id="24" name="Oval 23"/>
+          <p:cNvSpPr/>
+          <p:nvPr/>
+        </p:nvSpPr>
+        <p:spPr>
+          <a:xfrm>
+            <a:off x="3018367" y="2734081"/>
+            <a:ext cx="114299" cy="114299"/>
+          </a:xfrm>
+          <a:prstGeom prst="ellipse">
+            <a:avLst/>
+          </a:prstGeom>
+          <a:solidFill>
+            <a:srgbClr val="002060"/>
+          </a:solidFill>
+          <a:ln>
+            <a:solidFill>
+              <a:srgbClr val="002060"/>
+            </a:solidFill>
+          </a:ln>
+        </p:spPr>
+        <p:style>
+          <a:lnRef idx="2">
+            <a:schemeClr val="accent1">
+              <a:shade val="50000"/>
+            </a:schemeClr>
+          </a:lnRef>
+          <a:fillRef idx="1">
+            <a:schemeClr val="accent1"/>
+          </a:fillRef>
+          <a:effectRef idx="0">
+            <a:schemeClr val="accent1"/>
+          </a:effectRef>
+          <a:fontRef idx="minor">
+            <a:schemeClr val="lt1"/>
+          </a:fontRef>
+        </p:style>
+        <p:txBody>
+          <a:bodyPr rtlCol="0" anchor="ctr"/>
+          <a:lstStyle/>
+          <a:p>
+            <a:pPr algn="ctr"/>
+            <a:endParaRPr lang="en-SG" dirty="0"/>
+          </a:p>
+        </p:txBody>
+      </p:sp>
+      <p:sp>
+        <p:nvSpPr>
+          <p:cNvPr id="25" name="Oval 24"/>
+          <p:cNvSpPr/>
+          <p:nvPr/>
+        </p:nvSpPr>
+        <p:spPr>
+          <a:xfrm>
+            <a:off x="3707627" y="2734081"/>
+            <a:ext cx="114299" cy="114299"/>
+          </a:xfrm>
+          <a:prstGeom prst="ellipse">
+            <a:avLst/>
+          </a:prstGeom>
+          <a:solidFill>
+            <a:srgbClr val="FFC000"/>
+          </a:solidFill>
+          <a:ln>
+            <a:solidFill>
+              <a:srgbClr val="FFC000"/>
+            </a:solidFill>
+          </a:ln>
+        </p:spPr>
+        <p:style>
+          <a:lnRef idx="2">
+            <a:schemeClr val="accent1">
+              <a:shade val="50000"/>
+            </a:schemeClr>
+          </a:lnRef>
+          <a:fillRef idx="1">
+            <a:schemeClr val="accent1"/>
+          </a:fillRef>
+          <a:effectRef idx="0">
+            <a:schemeClr val="accent1"/>
+          </a:effectRef>
+          <a:fontRef idx="minor">
+            <a:schemeClr val="lt1"/>
+          </a:fontRef>
+        </p:style>
+        <p:txBody>
+          <a:bodyPr rtlCol="0" anchor="ctr"/>
+          <a:lstStyle/>
+          <a:p>
+            <a:pPr algn="ctr"/>
+            <a:endParaRPr lang="en-SG"/>
+          </a:p>
+        </p:txBody>
+      </p:sp>
+      <p:sp>
+        <p:nvSpPr>
+          <p:cNvPr id="27" name="Oval 26"/>
+          <p:cNvSpPr/>
+          <p:nvPr/>
+        </p:nvSpPr>
+        <p:spPr>
+          <a:xfrm>
+            <a:off x="4445104" y="3875588"/>
+            <a:ext cx="114299" cy="114299"/>
+          </a:xfrm>
+          <a:prstGeom prst="ellipse">
+            <a:avLst/>
+          </a:prstGeom>
+          <a:solidFill>
+            <a:schemeClr val="accent1"/>
+          </a:solidFill>
+          <a:ln>
+            <a:solidFill>
+              <a:schemeClr val="accent1"/>
+            </a:solidFill>
+          </a:ln>
+        </p:spPr>
+        <p:style>
+          <a:lnRef idx="2">
+            <a:schemeClr val="accent1">
+              <a:shade val="50000"/>
+            </a:schemeClr>
+          </a:lnRef>
+          <a:fillRef idx="1">
+            <a:schemeClr val="accent1"/>
+          </a:fillRef>
+          <a:effectRef idx="0">
+            <a:schemeClr val="accent1"/>
+          </a:effectRef>
+          <a:fontRef idx="minor">
+            <a:schemeClr val="lt1"/>
+          </a:fontRef>
+        </p:style>
+        <p:txBody>
+          <a:bodyPr rtlCol="0" anchor="ctr"/>
+          <a:lstStyle/>
+          <a:p>
+            <a:pPr algn="ctr"/>
+            <a:endParaRPr lang="en-SG"/>
+          </a:p>
+        </p:txBody>
+      </p:sp>
+      <p:sp>
+        <p:nvSpPr>
+          <p:cNvPr id="16" name="TextBox 15"/>
+          <p:cNvSpPr txBox="1"/>
+          <p:nvPr/>
+        </p:nvSpPr>
+        <p:spPr>
+          <a:xfrm>
+            <a:off x="4071969" y="3564967"/>
+            <a:ext cx="984565" cy="338554"/>
+          </a:xfrm>
+          <a:prstGeom prst="rect">
+            <a:avLst/>
+          </a:prstGeom>
+          <a:noFill/>
+        </p:spPr>
+        <p:txBody>
+          <a:bodyPr wrap="none" rtlCol="0">
+            <a:spAutoFit/>
+          </a:bodyPr>
+          <a:lstStyle/>
+          <a:p>
+            <a:r>
+              <a:rPr lang="en-SG" sz="1600" dirty="0" smtClean="0">
+                <a:solidFill>
+                  <a:schemeClr val="accent1"/>
+                </a:solidFill>
+              </a:rPr>
+              <a:t>BT Classic</a:t>
+            </a:r>
+            <a:endParaRPr lang="en-SG" sz="1600" dirty="0">
+              <a:solidFill>
+                <a:schemeClr val="accent1"/>
+              </a:solidFill>
+            </a:endParaRPr>
+          </a:p>
+        </p:txBody>
+      </p:sp>
+      <p:sp>
+        <p:nvSpPr>
+          <p:cNvPr id="33" name="Oval 32"/>
+          <p:cNvSpPr/>
+          <p:nvPr/>
+        </p:nvSpPr>
+        <p:spPr>
+          <a:xfrm>
+            <a:off x="5038882" y="4414518"/>
+            <a:ext cx="114299" cy="114299"/>
+          </a:xfrm>
+          <a:prstGeom prst="ellipse">
+            <a:avLst/>
+          </a:prstGeom>
+          <a:solidFill>
+            <a:srgbClr val="FF0000"/>
+          </a:solidFill>
+          <a:ln>
+            <a:solidFill>
+              <a:srgbClr val="FF0000"/>
+            </a:solidFill>
+          </a:ln>
+        </p:spPr>
+        <p:style>
+          <a:lnRef idx="2">
+            <a:schemeClr val="accent1">
+              <a:shade val="50000"/>
+            </a:schemeClr>
+          </a:lnRef>
+          <a:fillRef idx="1">
+            <a:schemeClr val="accent1"/>
+          </a:fillRef>
+          <a:effectRef idx="0">
+            <a:schemeClr val="accent1"/>
+          </a:effectRef>
+          <a:fontRef idx="minor">
+            <a:schemeClr val="lt1"/>
+          </a:fontRef>
+        </p:style>
+        <p:txBody>
+          <a:bodyPr rtlCol="0" anchor="ctr"/>
+          <a:lstStyle/>
+          <a:p>
+            <a:pPr algn="ctr"/>
+            <a:endParaRPr lang="en-SG"/>
+          </a:p>
+        </p:txBody>
+      </p:sp>
+      <p:sp>
+        <p:nvSpPr>
+          <p:cNvPr id="17" name="TextBox 16"/>
+          <p:cNvSpPr txBox="1"/>
+          <p:nvPr/>
+        </p:nvSpPr>
+        <p:spPr>
+          <a:xfrm>
+            <a:off x="4746351" y="4098075"/>
+            <a:ext cx="736099" cy="338554"/>
+          </a:xfrm>
+          <a:prstGeom prst="rect">
+            <a:avLst/>
+          </a:prstGeom>
+          <a:noFill/>
+        </p:spPr>
+        <p:txBody>
+          <a:bodyPr wrap="none" rtlCol="0">
+            <a:spAutoFit/>
+          </a:bodyPr>
+          <a:lstStyle/>
+          <a:p>
+            <a:r>
+              <a:rPr lang="en-SG" sz="1600" dirty="0" err="1" smtClean="0">
+                <a:solidFill>
+                  <a:srgbClr val="FF0000"/>
+                </a:solidFill>
+              </a:rPr>
+              <a:t>Zigbee</a:t>
+            </a:r>
+            <a:endParaRPr lang="en-SG" sz="1600" dirty="0">
+              <a:solidFill>
+                <a:srgbClr val="FF0000"/>
+              </a:solidFill>
+            </a:endParaRPr>
+          </a:p>
+        </p:txBody>
+      </p:sp>
+      <p:sp>
+        <p:nvSpPr>
+          <p:cNvPr id="34" name="Oval 33"/>
+          <p:cNvSpPr/>
+          <p:nvPr/>
+        </p:nvSpPr>
+        <p:spPr>
+          <a:xfrm>
+            <a:off x="4572000" y="5060956"/>
+            <a:ext cx="114299" cy="114299"/>
+          </a:xfrm>
+          <a:prstGeom prst="ellipse">
+            <a:avLst/>
+          </a:prstGeom>
+          <a:solidFill>
+            <a:srgbClr val="7030A0"/>
+          </a:solidFill>
+          <a:ln>
+            <a:solidFill>
+              <a:srgbClr val="7030A0"/>
+            </a:solidFill>
+          </a:ln>
+        </p:spPr>
+        <p:style>
+          <a:lnRef idx="2">
+            <a:schemeClr val="accent1">
+              <a:shade val="50000"/>
+            </a:schemeClr>
+          </a:lnRef>
+          <a:fillRef idx="1">
+            <a:schemeClr val="accent1"/>
+          </a:fillRef>
+          <a:effectRef idx="0">
+            <a:schemeClr val="accent1"/>
+          </a:effectRef>
+          <a:fontRef idx="minor">
+            <a:schemeClr val="lt1"/>
+          </a:fontRef>
+        </p:style>
+        <p:txBody>
+          <a:bodyPr rtlCol="0" anchor="ctr"/>
+          <a:lstStyle/>
+          <a:p>
+            <a:pPr algn="ctr"/>
+            <a:endParaRPr lang="en-SG"/>
           </a:p>
         </p:txBody>
       </p:sp>
@@ -34169,7 +34224,7 @@
                                           </p:stCondLst>
                                         </p:cTn>
                                         <p:tgtEl>
-                                          <p:spTgt spid="5"/>
+                                          <p:spTgt spid="22"/>
                                         </p:tgtEl>
                                         <p:attrNameLst>
                                           <p:attrName>style.visibility</p:attrName>
@@ -34183,7 +34238,42 @@
                                       <p:cBhvr>
                                         <p:cTn id="7" dur="500"/>
                                         <p:tgtEl>
-                                          <p:spTgt spid="5"/>
+                                          <p:spTgt spid="22"/>
+                                        </p:tgtEl>
+                                      </p:cBhvr>
+                                    </p:animEffect>
+                                  </p:childTnLst>
+                                </p:cTn>
+                              </p:par>
+                              <p:par>
+                                <p:cTn id="8" presetID="10" presetClass="entr" presetSubtype="0" fill="hold" grpId="0" nodeType="withEffect">
+                                  <p:stCondLst>
+                                    <p:cond delay="0"/>
+                                  </p:stCondLst>
+                                  <p:childTnLst>
+                                    <p:set>
+                                      <p:cBhvr>
+                                        <p:cTn id="9" dur="1" fill="hold">
+                                          <p:stCondLst>
+                                            <p:cond delay="0"/>
+                                          </p:stCondLst>
+                                        </p:cTn>
+                                        <p:tgtEl>
+                                          <p:spTgt spid="14"/>
+                                        </p:tgtEl>
+                                        <p:attrNameLst>
+                                          <p:attrName>style.visibility</p:attrName>
+                                        </p:attrNameLst>
+                                      </p:cBhvr>
+                                      <p:to>
+                                        <p:strVal val="visible"/>
+                                      </p:to>
+                                    </p:set>
+                                    <p:animEffect transition="in" filter="fade">
+                                      <p:cBhvr>
+                                        <p:cTn id="10" dur="500"/>
+                                        <p:tgtEl>
+                                          <p:spTgt spid="14"/>
                                         </p:tgtEl>
                                       </p:cBhvr>
                                     </p:animEffect>
@@ -34197,32 +34287,32 @@
                     </p:cTn>
                   </p:par>
                   <p:par>
-                    <p:cTn id="8" fill="hold">
+                    <p:cTn id="11" fill="hold">
                       <p:stCondLst>
                         <p:cond delay="indefinite"/>
                       </p:stCondLst>
                       <p:childTnLst>
                         <p:par>
-                          <p:cTn id="9" fill="hold">
+                          <p:cTn id="12" fill="hold">
                             <p:stCondLst>
                               <p:cond delay="0"/>
                             </p:stCondLst>
                             <p:childTnLst>
                               <p:par>
-                                <p:cTn id="10" presetID="10" presetClass="entr" presetSubtype="0" fill="hold" grpId="0" nodeType="clickEffect">
+                                <p:cTn id="13" presetID="10" presetClass="entr" presetSubtype="0" fill="hold" grpId="0" nodeType="clickEffect">
                                   <p:stCondLst>
                                     <p:cond delay="0"/>
                                   </p:stCondLst>
                                   <p:childTnLst>
                                     <p:set>
                                       <p:cBhvr>
-                                        <p:cTn id="11" dur="1" fill="hold">
+                                        <p:cTn id="14" dur="1" fill="hold">
                                           <p:stCondLst>
                                             <p:cond delay="0"/>
                                           </p:stCondLst>
                                         </p:cTn>
                                         <p:tgtEl>
-                                          <p:spTgt spid="23"/>
+                                          <p:spTgt spid="25"/>
                                         </p:tgtEl>
                                         <p:attrNameLst>
                                           <p:attrName>style.visibility</p:attrName>
@@ -34234,9 +34324,9 @@
                                     </p:set>
                                     <p:animEffect transition="in" filter="fade">
                                       <p:cBhvr>
-                                        <p:cTn id="12" dur="500"/>
-                                        <p:tgtEl>
-                                          <p:spTgt spid="23"/>
+                                        <p:cTn id="15" dur="500"/>
+                                        <p:tgtEl>
+                                          <p:spTgt spid="25"/>
                                         </p:tgtEl>
                                       </p:cBhvr>
                                     </p:animEffect>
@@ -34244,14 +34334,14 @@
                                 </p:cTn>
                               </p:par>
                               <p:par>
-                                <p:cTn id="13" presetID="10" presetClass="entr" presetSubtype="0" fill="hold" grpId="0" nodeType="withEffect">
+                                <p:cTn id="16" presetID="10" presetClass="entr" presetSubtype="0" fill="hold" grpId="0" nodeType="withEffect">
                                   <p:stCondLst>
                                     <p:cond delay="0"/>
                                   </p:stCondLst>
                                   <p:childTnLst>
                                     <p:set>
                                       <p:cBhvr>
-                                        <p:cTn id="14" dur="1" fill="hold">
+                                        <p:cTn id="17" dur="1" fill="hold">
                                           <p:stCondLst>
                                             <p:cond delay="0"/>
                                           </p:stCondLst>
@@ -34269,7 +34359,7 @@
                                     </p:set>
                                     <p:animEffect transition="in" filter="fade">
                                       <p:cBhvr>
-                                        <p:cTn id="15" dur="500"/>
+                                        <p:cTn id="18" dur="500"/>
                                         <p:tgtEl>
                                           <p:spTgt spid="12"/>
                                         </p:tgtEl>
@@ -34285,32 +34375,32 @@
                     </p:cTn>
                   </p:par>
                   <p:par>
-                    <p:cTn id="16" fill="hold">
+                    <p:cTn id="19" fill="hold">
                       <p:stCondLst>
                         <p:cond delay="indefinite"/>
                       </p:stCondLst>
                       <p:childTnLst>
                         <p:par>
-                          <p:cTn id="17" fill="hold">
+                          <p:cTn id="20" fill="hold">
                             <p:stCondLst>
                               <p:cond delay="0"/>
                             </p:stCondLst>
                             <p:childTnLst>
                               <p:par>
-                                <p:cTn id="18" presetID="10" presetClass="entr" presetSubtype="0" fill="hold" grpId="0" nodeType="clickEffect">
+                                <p:cTn id="21" presetID="10" presetClass="entr" presetSubtype="0" fill="hold" grpId="0" nodeType="clickEffect">
                                   <p:stCondLst>
                                     <p:cond delay="0"/>
                                   </p:stCondLst>
                                   <p:childTnLst>
                                     <p:set>
                                       <p:cBhvr>
-                                        <p:cTn id="19" dur="1" fill="hold">
+                                        <p:cTn id="22" dur="1" fill="hold">
                                           <p:stCondLst>
                                             <p:cond delay="0"/>
                                           </p:stCondLst>
                                         </p:cTn>
                                         <p:tgtEl>
-                                          <p:spTgt spid="26"/>
+                                          <p:spTgt spid="24"/>
                                         </p:tgtEl>
                                         <p:attrNameLst>
                                           <p:attrName>style.visibility</p:attrName>
@@ -34322,9 +34412,9 @@
                                     </p:set>
                                     <p:animEffect transition="in" filter="fade">
                                       <p:cBhvr>
-                                        <p:cTn id="20" dur="500"/>
-                                        <p:tgtEl>
-                                          <p:spTgt spid="26"/>
+                                        <p:cTn id="23" dur="500"/>
+                                        <p:tgtEl>
+                                          <p:spTgt spid="24"/>
                                         </p:tgtEl>
                                       </p:cBhvr>
                                     </p:animEffect>
@@ -34332,14 +34422,14 @@
                                 </p:cTn>
                               </p:par>
                               <p:par>
-                                <p:cTn id="21" presetID="10" presetClass="entr" presetSubtype="0" fill="hold" grpId="0" nodeType="withEffect">
+                                <p:cTn id="24" presetID="10" presetClass="entr" presetSubtype="0" fill="hold" grpId="0" nodeType="withEffect">
                                   <p:stCondLst>
                                     <p:cond delay="0"/>
                                   </p:stCondLst>
                                   <p:childTnLst>
                                     <p:set>
                                       <p:cBhvr>
-                                        <p:cTn id="22" dur="1" fill="hold">
+                                        <p:cTn id="25" dur="1" fill="hold">
                                           <p:stCondLst>
                                             <p:cond delay="0"/>
                                           </p:stCondLst>
@@ -34357,7 +34447,7 @@
                                     </p:set>
                                     <p:animEffect transition="in" filter="fade">
                                       <p:cBhvr>
-                                        <p:cTn id="23" dur="500"/>
+                                        <p:cTn id="26" dur="500"/>
                                         <p:tgtEl>
                                           <p:spTgt spid="6"/>
                                         </p:tgtEl>
@@ -34373,32 +34463,32 @@
                     </p:cTn>
                   </p:par>
                   <p:par>
-                    <p:cTn id="24" fill="hold">
+                    <p:cTn id="27" fill="hold">
                       <p:stCondLst>
                         <p:cond delay="indefinite"/>
                       </p:stCondLst>
                       <p:childTnLst>
                         <p:par>
-                          <p:cTn id="25" fill="hold">
+                          <p:cTn id="28" fill="hold">
                             <p:stCondLst>
                               <p:cond delay="0"/>
                             </p:stCondLst>
                             <p:childTnLst>
                               <p:par>
-                                <p:cTn id="26" presetID="10" presetClass="entr" presetSubtype="0" fill="hold" grpId="0" nodeType="clickEffect">
+                                <p:cTn id="29" presetID="10" presetClass="entr" presetSubtype="0" fill="hold" grpId="0" nodeType="clickEffect">
                                   <p:stCondLst>
                                     <p:cond delay="0"/>
                                   </p:stCondLst>
                                   <p:childTnLst>
                                     <p:set>
                                       <p:cBhvr>
-                                        <p:cTn id="27" dur="1" fill="hold">
+                                        <p:cTn id="30" dur="1" fill="hold">
                                           <p:stCondLst>
                                             <p:cond delay="0"/>
                                           </p:stCondLst>
                                         </p:cTn>
                                         <p:tgtEl>
-                                          <p:spTgt spid="28"/>
+                                          <p:spTgt spid="10"/>
                                         </p:tgtEl>
                                         <p:attrNameLst>
                                           <p:attrName>style.visibility</p:attrName>
@@ -34410,9 +34500,44 @@
                                     </p:set>
                                     <p:animEffect transition="in" filter="fade">
                                       <p:cBhvr>
-                                        <p:cTn id="28" dur="500"/>
-                                        <p:tgtEl>
-                                          <p:spTgt spid="28"/>
+                                        <p:cTn id="31" dur="500"/>
+                                        <p:tgtEl>
+                                          <p:spTgt spid="10"/>
+                                        </p:tgtEl>
+                                      </p:cBhvr>
+                                    </p:animEffect>
+                                  </p:childTnLst>
+                                </p:cTn>
+                              </p:par>
+                              <p:par>
+                                <p:cTn id="32" presetID="10" presetClass="entr" presetSubtype="0" fill="hold" grpId="0" nodeType="withEffect">
+                                  <p:stCondLst>
+                                    <p:cond delay="0"/>
+                                  </p:stCondLst>
+                                  <p:childTnLst>
+                                    <p:set>
+                                      <p:cBhvr>
+                                        <p:cTn id="33" dur="1" fill="hold">
+                                          <p:stCondLst>
+                                            <p:cond delay="0"/>
+                                          </p:stCondLst>
+                                        </p:cTn>
+                                        <p:tgtEl>
+                                          <p:spTgt spid="13"/>
+                                        </p:tgtEl>
+                                        <p:attrNameLst>
+                                          <p:attrName>style.visibility</p:attrName>
+                                        </p:attrNameLst>
+                                      </p:cBhvr>
+                                      <p:to>
+                                        <p:strVal val="visible"/>
+                                      </p:to>
+                                    </p:set>
+                                    <p:animEffect transition="in" filter="fade">
+                                      <p:cBhvr>
+                                        <p:cTn id="34" dur="500"/>
+                                        <p:tgtEl>
+                                          <p:spTgt spid="13"/>
                                         </p:tgtEl>
                                       </p:cBhvr>
                                     </p:animEffect>
@@ -34426,32 +34551,32 @@
                     </p:cTn>
                   </p:par>
                   <p:par>
-                    <p:cTn id="29" fill="hold">
+                    <p:cTn id="35" fill="hold">
                       <p:stCondLst>
                         <p:cond delay="indefinite"/>
                       </p:stCondLst>
                       <p:childTnLst>
                         <p:par>
-                          <p:cTn id="30" fill="hold">
+                          <p:cTn id="36" fill="hold">
                             <p:stCondLst>
                               <p:cond delay="0"/>
                             </p:stCondLst>
                             <p:childTnLst>
                               <p:par>
-                                <p:cTn id="31" presetID="10" presetClass="entr" presetSubtype="0" fill="hold" grpId="0" nodeType="clickEffect">
+                                <p:cTn id="37" presetID="10" presetClass="entr" presetSubtype="0" fill="hold" grpId="0" nodeType="clickEffect">
                                   <p:stCondLst>
                                     <p:cond delay="0"/>
                                   </p:stCondLst>
                                   <p:childTnLst>
                                     <p:set>
                                       <p:cBhvr>
-                                        <p:cTn id="32" dur="1" fill="hold">
+                                        <p:cTn id="38" dur="1" fill="hold">
                                           <p:stCondLst>
                                             <p:cond delay="0"/>
                                           </p:stCondLst>
                                         </p:cTn>
                                         <p:tgtEl>
-                                          <p:spTgt spid="29"/>
+                                          <p:spTgt spid="27"/>
                                         </p:tgtEl>
                                         <p:attrNameLst>
                                           <p:attrName>style.visibility</p:attrName>
@@ -34463,9 +34588,44 @@
                                     </p:set>
                                     <p:animEffect transition="in" filter="fade">
                                       <p:cBhvr>
-                                        <p:cTn id="33" dur="500"/>
-                                        <p:tgtEl>
-                                          <p:spTgt spid="29"/>
+                                        <p:cTn id="39" dur="500"/>
+                                        <p:tgtEl>
+                                          <p:spTgt spid="27"/>
+                                        </p:tgtEl>
+                                      </p:cBhvr>
+                                    </p:animEffect>
+                                  </p:childTnLst>
+                                </p:cTn>
+                              </p:par>
+                              <p:par>
+                                <p:cTn id="40" presetID="10" presetClass="entr" presetSubtype="0" fill="hold" grpId="0" nodeType="withEffect">
+                                  <p:stCondLst>
+                                    <p:cond delay="0"/>
+                                  </p:stCondLst>
+                                  <p:childTnLst>
+                                    <p:set>
+                                      <p:cBhvr>
+                                        <p:cTn id="41" dur="1" fill="hold">
+                                          <p:stCondLst>
+                                            <p:cond delay="0"/>
+                                          </p:stCondLst>
+                                        </p:cTn>
+                                        <p:tgtEl>
+                                          <p:spTgt spid="16"/>
+                                        </p:tgtEl>
+                                        <p:attrNameLst>
+                                          <p:attrName>style.visibility</p:attrName>
+                                        </p:attrNameLst>
+                                      </p:cBhvr>
+                                      <p:to>
+                                        <p:strVal val="visible"/>
+                                      </p:to>
+                                    </p:set>
+                                    <p:animEffect transition="in" filter="fade">
+                                      <p:cBhvr>
+                                        <p:cTn id="42" dur="500"/>
+                                        <p:tgtEl>
+                                          <p:spTgt spid="16"/>
                                         </p:tgtEl>
                                       </p:cBhvr>
                                     </p:animEffect>
@@ -34479,32 +34639,32 @@
                     </p:cTn>
                   </p:par>
                   <p:par>
-                    <p:cTn id="34" fill="hold">
+                    <p:cTn id="43" fill="hold">
                       <p:stCondLst>
                         <p:cond delay="indefinite"/>
                       </p:stCondLst>
                       <p:childTnLst>
                         <p:par>
-                          <p:cTn id="35" fill="hold">
+                          <p:cTn id="44" fill="hold">
                             <p:stCondLst>
                               <p:cond delay="0"/>
                             </p:stCondLst>
                             <p:childTnLst>
                               <p:par>
-                                <p:cTn id="36" presetID="10" presetClass="entr" presetSubtype="0" fill="hold" grpId="0" nodeType="clickEffect">
+                                <p:cTn id="45" presetID="10" presetClass="entr" presetSubtype="0" fill="hold" grpId="0" nodeType="clickEffect">
                                   <p:stCondLst>
                                     <p:cond delay="0"/>
                                   </p:stCondLst>
                                   <p:childTnLst>
                                     <p:set>
                                       <p:cBhvr>
-                                        <p:cTn id="37" dur="1" fill="hold">
+                                        <p:cTn id="46" dur="1" fill="hold">
                                           <p:stCondLst>
                                             <p:cond delay="0"/>
                                           </p:stCondLst>
                                         </p:cTn>
                                         <p:tgtEl>
-                                          <p:spTgt spid="32"/>
+                                          <p:spTgt spid="33"/>
                                         </p:tgtEl>
                                         <p:attrNameLst>
                                           <p:attrName>style.visibility</p:attrName>
@@ -34516,9 +34676,44 @@
                                     </p:set>
                                     <p:animEffect transition="in" filter="fade">
                                       <p:cBhvr>
-                                        <p:cTn id="38" dur="500"/>
-                                        <p:tgtEl>
-                                          <p:spTgt spid="32"/>
+                                        <p:cTn id="47" dur="500"/>
+                                        <p:tgtEl>
+                                          <p:spTgt spid="33"/>
+                                        </p:tgtEl>
+                                      </p:cBhvr>
+                                    </p:animEffect>
+                                  </p:childTnLst>
+                                </p:cTn>
+                              </p:par>
+                              <p:par>
+                                <p:cTn id="48" presetID="10" presetClass="entr" presetSubtype="0" fill="hold" grpId="0" nodeType="withEffect">
+                                  <p:stCondLst>
+                                    <p:cond delay="0"/>
+                                  </p:stCondLst>
+                                  <p:childTnLst>
+                                    <p:set>
+                                      <p:cBhvr>
+                                        <p:cTn id="49" dur="1" fill="hold">
+                                          <p:stCondLst>
+                                            <p:cond delay="0"/>
+                                          </p:stCondLst>
+                                        </p:cTn>
+                                        <p:tgtEl>
+                                          <p:spTgt spid="17"/>
+                                        </p:tgtEl>
+                                        <p:attrNameLst>
+                                          <p:attrName>style.visibility</p:attrName>
+                                        </p:attrNameLst>
+                                      </p:cBhvr>
+                                      <p:to>
+                                        <p:strVal val="visible"/>
+                                      </p:to>
+                                    </p:set>
+                                    <p:animEffect transition="in" filter="fade">
+                                      <p:cBhvr>
+                                        <p:cTn id="50" dur="500"/>
+                                        <p:tgtEl>
+                                          <p:spTgt spid="17"/>
                                         </p:tgtEl>
                                       </p:cBhvr>
                                     </p:animEffect>
@@ -34532,32 +34727,32 @@
                     </p:cTn>
                   </p:par>
                   <p:par>
-                    <p:cTn id="39" fill="hold">
+                    <p:cTn id="51" fill="hold">
                       <p:stCondLst>
                         <p:cond delay="indefinite"/>
                       </p:stCondLst>
                       <p:childTnLst>
                         <p:par>
-                          <p:cTn id="40" fill="hold">
+                          <p:cTn id="52" fill="hold">
                             <p:stCondLst>
                               <p:cond delay="0"/>
                             </p:stCondLst>
                             <p:childTnLst>
                               <p:par>
-                                <p:cTn id="41" presetID="10" presetClass="entr" presetSubtype="0" fill="hold" grpId="0" nodeType="clickEffect">
+                                <p:cTn id="53" presetID="10" presetClass="entr" presetSubtype="0" fill="hold" grpId="0" nodeType="clickEffect">
                                   <p:stCondLst>
                                     <p:cond delay="0"/>
                                   </p:stCondLst>
                                   <p:childTnLst>
                                     <p:set>
                                       <p:cBhvr>
-                                        <p:cTn id="42" dur="1" fill="hold">
+                                        <p:cTn id="54" dur="1" fill="hold">
                                           <p:stCondLst>
                                             <p:cond delay="0"/>
                                           </p:stCondLst>
                                         </p:cTn>
                                         <p:tgtEl>
-                                          <p:spTgt spid="30"/>
+                                          <p:spTgt spid="34"/>
                                         </p:tgtEl>
                                         <p:attrNameLst>
                                           <p:attrName>style.visibility</p:attrName>
@@ -34569,9 +34764,9 @@
                                     </p:set>
                                     <p:animEffect transition="in" filter="fade">
                                       <p:cBhvr>
-                                        <p:cTn id="43" dur="500"/>
-                                        <p:tgtEl>
-                                          <p:spTgt spid="30"/>
+                                        <p:cTn id="55" dur="500"/>
+                                        <p:tgtEl>
+                                          <p:spTgt spid="34"/>
                                         </p:tgtEl>
                                       </p:cBhvr>
                                     </p:animEffect>
@@ -34579,14 +34774,14 @@
                                 </p:cTn>
                               </p:par>
                               <p:par>
-                                <p:cTn id="44" presetID="10" presetClass="entr" presetSubtype="0" fill="hold" grpId="0" nodeType="withEffect">
+                                <p:cTn id="56" presetID="10" presetClass="entr" presetSubtype="0" fill="hold" grpId="0" nodeType="withEffect">
                                   <p:stCondLst>
                                     <p:cond delay="0"/>
                                   </p:stCondLst>
                                   <p:childTnLst>
                                     <p:set>
                                       <p:cBhvr>
-                                        <p:cTn id="45" dur="1" fill="hold">
+                                        <p:cTn id="57" dur="1" fill="hold">
                                           <p:stCondLst>
                                             <p:cond delay="0"/>
                                           </p:stCondLst>
@@ -34604,7 +34799,7 @@
                                     </p:set>
                                     <p:animEffect transition="in" filter="fade">
                                       <p:cBhvr>
-                                        <p:cTn id="46" dur="500"/>
+                                        <p:cTn id="58" dur="500"/>
                                         <p:tgtEl>
                                           <p:spTgt spid="15"/>
                                         </p:tgtEl>
@@ -34620,26 +34815,26 @@
                     </p:cTn>
                   </p:par>
                   <p:par>
-                    <p:cTn id="47" fill="hold">
+                    <p:cTn id="59" fill="hold">
                       <p:stCondLst>
                         <p:cond delay="indefinite"/>
                       </p:stCondLst>
                       <p:childTnLst>
                         <p:par>
-                          <p:cTn id="48" fill="hold">
+                          <p:cTn id="60" fill="hold">
                             <p:stCondLst>
                               <p:cond delay="0"/>
                             </p:stCondLst>
                             <p:childTnLst>
                               <p:par>
-                                <p:cTn id="49" presetID="10" presetClass="entr" presetSubtype="0" fill="hold" grpId="0" nodeType="clickEffect">
+                                <p:cTn id="61" presetID="10" presetClass="entr" presetSubtype="0" fill="hold" grpId="0" nodeType="clickEffect">
                                   <p:stCondLst>
                                     <p:cond delay="0"/>
                                   </p:stCondLst>
                                   <p:childTnLst>
                                     <p:set>
                                       <p:cBhvr>
-                                        <p:cTn id="50" dur="1" fill="hold">
+                                        <p:cTn id="62" dur="1" fill="hold">
                                           <p:stCondLst>
                                             <p:cond delay="0"/>
                                           </p:stCondLst>
@@ -34657,7 +34852,7 @@
                                     </p:set>
                                     <p:animEffect transition="in" filter="fade">
                                       <p:cBhvr>
-                                        <p:cTn id="51" dur="500"/>
+                                        <p:cTn id="63" dur="500"/>
                                         <p:tgtEl>
                                           <p:spTgt spid="31"/>
                                         </p:tgtEl>
@@ -34694,17 +34889,21 @@
       </p:par>
     </p:tnLst>
     <p:bldLst>
-      <p:bldP spid="5" grpId="0" animBg="1"/>
-      <p:bldP spid="23" grpId="0" animBg="1"/>
-      <p:bldP spid="26" grpId="0" animBg="1"/>
-      <p:bldP spid="28" grpId="0" animBg="1"/>
       <p:bldP spid="31" grpId="0"/>
-      <p:bldP spid="32" grpId="0" animBg="1"/>
-      <p:bldP spid="30" grpId="0" animBg="1"/>
-      <p:bldP spid="29" grpId="0" animBg="1"/>
       <p:bldP spid="6" grpId="0"/>
       <p:bldP spid="12" grpId="0"/>
       <p:bldP spid="15" grpId="0"/>
+      <p:bldP spid="10" grpId="0" animBg="1"/>
+      <p:bldP spid="13" grpId="0"/>
+      <p:bldP spid="22" grpId="0" animBg="1"/>
+      <p:bldP spid="14" grpId="0"/>
+      <p:bldP spid="24" grpId="0" animBg="1"/>
+      <p:bldP spid="25" grpId="0" animBg="1"/>
+      <p:bldP spid="27" grpId="0" animBg="1"/>
+      <p:bldP spid="16" grpId="0"/>
+      <p:bldP spid="33" grpId="0" animBg="1"/>
+      <p:bldP spid="17" grpId="0"/>
+      <p:bldP spid="34" grpId="0" animBg="1"/>
     </p:bldLst>
   </p:timing>
 </p:sld>

</xml_diff>

<commit_message>
update for iOS dev scout
</commit_message>
<xml_diff>
--- a/intro to ble.pptx
+++ b/intro to ble.pptx
@@ -244,7 +244,7 @@
           <a:p>
             <a:fld id="{CB69E15D-2E95-428C-B9E3-27B2BF3879D0}" type="datetimeFigureOut">
               <a:rPr lang="en-SG" smtClean="0"/>
-              <a:t>17/2/2016</a:t>
+              <a:t>4/6/16</a:t>
             </a:fld>
             <a:endParaRPr lang="en-SG"/>
           </a:p>
@@ -811,7 +811,7 @@
           <a:p>
             <a:fld id="{14C94871-C4DF-4AFD-96E5-87B050A67E05}" type="datetime1">
               <a:rPr lang="en-SG" smtClean="0"/>
-              <a:t>17/2/2016</a:t>
+              <a:t>4/6/16</a:t>
             </a:fld>
             <a:endParaRPr lang="en-SG"/>
           </a:p>
@@ -981,7 +981,7 @@
           <a:p>
             <a:fld id="{76A6DE21-0D8F-4C8C-AF6A-521466B16426}" type="datetime1">
               <a:rPr lang="en-SG" smtClean="0"/>
-              <a:t>17/2/2016</a:t>
+              <a:t>4/6/16</a:t>
             </a:fld>
             <a:endParaRPr lang="en-SG"/>
           </a:p>
@@ -1161,7 +1161,7 @@
           <a:p>
             <a:fld id="{16A18ED7-72CF-4BB2-8941-928963568089}" type="datetime1">
               <a:rPr lang="en-SG" smtClean="0"/>
-              <a:t>17/2/2016</a:t>
+              <a:t>4/6/16</a:t>
             </a:fld>
             <a:endParaRPr lang="en-SG"/>
           </a:p>
@@ -1331,7 +1331,7 @@
           <a:p>
             <a:fld id="{7FD7CD52-9833-4DD5-89FF-33E59F171421}" type="datetime1">
               <a:rPr lang="en-SG" smtClean="0"/>
-              <a:t>17/2/2016</a:t>
+              <a:t>4/6/16</a:t>
             </a:fld>
             <a:endParaRPr lang="en-SG"/>
           </a:p>
@@ -1575,7 +1575,7 @@
           <a:p>
             <a:fld id="{E74C9598-7F32-4DE4-BFF0-39C051013B34}" type="datetime1">
               <a:rPr lang="en-SG" smtClean="0"/>
-              <a:t>17/2/2016</a:t>
+              <a:t>4/6/16</a:t>
             </a:fld>
             <a:endParaRPr lang="en-SG"/>
           </a:p>
@@ -1807,7 +1807,7 @@
           <a:p>
             <a:fld id="{5DC821E8-33B0-41D5-8FA5-9A647E53891C}" type="datetime1">
               <a:rPr lang="en-SG" smtClean="0"/>
-              <a:t>17/2/2016</a:t>
+              <a:t>4/6/16</a:t>
             </a:fld>
             <a:endParaRPr lang="en-SG"/>
           </a:p>
@@ -2174,7 +2174,7 @@
           <a:p>
             <a:fld id="{751CCC62-50F5-4228-8D51-6D258C0BFCBD}" type="datetime1">
               <a:rPr lang="en-SG" smtClean="0"/>
-              <a:t>17/2/2016</a:t>
+              <a:t>4/6/16</a:t>
             </a:fld>
             <a:endParaRPr lang="en-SG"/>
           </a:p>
@@ -2292,7 +2292,7 @@
           <a:p>
             <a:fld id="{776807E8-5434-437A-A610-A94C24A73164}" type="datetime1">
               <a:rPr lang="en-SG" smtClean="0"/>
-              <a:t>17/2/2016</a:t>
+              <a:t>4/6/16</a:t>
             </a:fld>
             <a:endParaRPr lang="en-SG"/>
           </a:p>
@@ -2387,7 +2387,7 @@
           <a:p>
             <a:fld id="{18AC243E-E412-41F8-A99C-62E3D2C4FD1E}" type="datetime1">
               <a:rPr lang="en-SG" smtClean="0"/>
-              <a:t>17/2/2016</a:t>
+              <a:t>4/6/16</a:t>
             </a:fld>
             <a:endParaRPr lang="en-SG"/>
           </a:p>
@@ -2664,7 +2664,7 @@
           <a:p>
             <a:fld id="{30DD06DC-63F5-45CF-A3A5-F437A0C7E12A}" type="datetime1">
               <a:rPr lang="en-SG" smtClean="0"/>
-              <a:t>17/2/2016</a:t>
+              <a:t>4/6/16</a:t>
             </a:fld>
             <a:endParaRPr lang="en-SG"/>
           </a:p>
@@ -2921,7 +2921,7 @@
           <a:p>
             <a:fld id="{7810AE82-8C34-472D-B90B-4D50508F585C}" type="datetime1">
               <a:rPr lang="en-SG" smtClean="0"/>
-              <a:t>17/2/2016</a:t>
+              <a:t>4/6/16</a:t>
             </a:fld>
             <a:endParaRPr lang="en-SG"/>
           </a:p>
@@ -3134,7 +3134,7 @@
           <a:p>
             <a:fld id="{393BD624-3486-430E-A0CD-3F2C92C8E573}" type="datetime1">
               <a:rPr lang="en-SG" smtClean="0"/>
-              <a:t>17/2/2016</a:t>
+              <a:t>4/6/16</a:t>
             </a:fld>
             <a:endParaRPr lang="en-SG"/>
           </a:p>
@@ -3657,8 +3657,8 @@
         </p:nvSpPr>
         <p:spPr>
           <a:xfrm>
-            <a:off x="130848" y="5380672"/>
-            <a:ext cx="4413516" cy="1477328"/>
+            <a:off x="63115" y="5015419"/>
+            <a:ext cx="4413516" cy="1754326"/>
           </a:xfrm>
           <a:prstGeom prst="rect">
             <a:avLst/>
@@ -3673,7 +3673,17 @@
           <a:p>
             <a:r>
               <a:rPr lang="en-SG" dirty="0" smtClean="0"/>
-              <a:t>Tech Talk Tuesdays @OMG (16 Feb 2016)</a:t>
+              <a:t>iOS Dev Scout (23 June 2016)</a:t>
+            </a:r>
+          </a:p>
+          <a:p>
+            <a:r>
+              <a:rPr lang="en-SG" dirty="0" smtClean="0"/>
+              <a:t>Tech </a:t>
+            </a:r>
+            <a:r>
+              <a:rPr lang="en-SG" dirty="0" smtClean="0"/>
+              <a:t>Talk Tuesdays @OMG (16 Feb 2016)</a:t>
             </a:r>
           </a:p>
           <a:p>
@@ -5568,14 +5578,14 @@
                 <a:gridCol w="3368099">
                   <a:extLst>
                     <a:ext uri="{9D8B030D-6E8A-4147-A177-3AD203B41FA5}">
-                      <a16:colId xmlns:a16="http://schemas.microsoft.com/office/drawing/2014/main" val="20000"/>
+                      <a16:colId xmlns:a16="http://schemas.microsoft.com/office/drawing/2014/main" xmlns="" val="20000"/>
                     </a:ext>
                   </a:extLst>
                 </a:gridCol>
                 <a:gridCol w="5174322">
                   <a:extLst>
                     <a:ext uri="{9D8B030D-6E8A-4147-A177-3AD203B41FA5}">
-                      <a16:colId xmlns:a16="http://schemas.microsoft.com/office/drawing/2014/main" val="20001"/>
+                      <a16:colId xmlns:a16="http://schemas.microsoft.com/office/drawing/2014/main" xmlns="" val="20001"/>
                     </a:ext>
                   </a:extLst>
                 </a:gridCol>
@@ -5615,7 +5625,7 @@
                 </a:tc>
                 <a:extLst>
                   <a:ext uri="{0D108BD9-81ED-4DB2-BD59-A6C34878D82A}">
-                    <a16:rowId xmlns:a16="http://schemas.microsoft.com/office/drawing/2014/main" val="10000"/>
+                    <a16:rowId xmlns:a16="http://schemas.microsoft.com/office/drawing/2014/main" xmlns="" val="10000"/>
                   </a:ext>
                 </a:extLst>
               </a:tr>
@@ -5650,7 +5660,7 @@
                 </a:tc>
                 <a:extLst>
                   <a:ext uri="{0D108BD9-81ED-4DB2-BD59-A6C34878D82A}">
-                    <a16:rowId xmlns:a16="http://schemas.microsoft.com/office/drawing/2014/main" val="10001"/>
+                    <a16:rowId xmlns:a16="http://schemas.microsoft.com/office/drawing/2014/main" xmlns="" val="10001"/>
                   </a:ext>
                 </a:extLst>
               </a:tr>
@@ -5685,7 +5695,7 @@
                 </a:tc>
                 <a:extLst>
                   <a:ext uri="{0D108BD9-81ED-4DB2-BD59-A6C34878D82A}">
-                    <a16:rowId xmlns:a16="http://schemas.microsoft.com/office/drawing/2014/main" val="10002"/>
+                    <a16:rowId xmlns:a16="http://schemas.microsoft.com/office/drawing/2014/main" xmlns="" val="10002"/>
                   </a:ext>
                 </a:extLst>
               </a:tr>
@@ -5720,7 +5730,7 @@
                 </a:tc>
                 <a:extLst>
                   <a:ext uri="{0D108BD9-81ED-4DB2-BD59-A6C34878D82A}">
-                    <a16:rowId xmlns:a16="http://schemas.microsoft.com/office/drawing/2014/main" val="10003"/>
+                    <a16:rowId xmlns:a16="http://schemas.microsoft.com/office/drawing/2014/main" xmlns="" val="10003"/>
                   </a:ext>
                 </a:extLst>
               </a:tr>
@@ -6033,14 +6043,14 @@
                 <a:gridCol w="4184649">
                   <a:extLst>
                     <a:ext uri="{9D8B030D-6E8A-4147-A177-3AD203B41FA5}">
-                      <a16:colId xmlns:a16="http://schemas.microsoft.com/office/drawing/2014/main" val="20000"/>
+                      <a16:colId xmlns:a16="http://schemas.microsoft.com/office/drawing/2014/main" xmlns="" val="20000"/>
                     </a:ext>
                   </a:extLst>
                 </a:gridCol>
                 <a:gridCol w="4184649">
                   <a:extLst>
                     <a:ext uri="{9D8B030D-6E8A-4147-A177-3AD203B41FA5}">
-                      <a16:colId xmlns:a16="http://schemas.microsoft.com/office/drawing/2014/main" val="20001"/>
+                      <a16:colId xmlns:a16="http://schemas.microsoft.com/office/drawing/2014/main" xmlns="" val="20001"/>
                     </a:ext>
                   </a:extLst>
                 </a:gridCol>
@@ -6082,7 +6092,7 @@
                 </a:tc>
                 <a:extLst>
                   <a:ext uri="{0D108BD9-81ED-4DB2-BD59-A6C34878D82A}">
-                    <a16:rowId xmlns:a16="http://schemas.microsoft.com/office/drawing/2014/main" val="10000"/>
+                    <a16:rowId xmlns:a16="http://schemas.microsoft.com/office/drawing/2014/main" xmlns="" val="10000"/>
                   </a:ext>
                 </a:extLst>
               </a:tr>
@@ -6612,7 +6622,7 @@
                 </a:tc>
                 <a:extLst>
                   <a:ext uri="{0D108BD9-81ED-4DB2-BD59-A6C34878D82A}">
-                    <a16:rowId xmlns:a16="http://schemas.microsoft.com/office/drawing/2014/main" val="10001"/>
+                    <a16:rowId xmlns:a16="http://schemas.microsoft.com/office/drawing/2014/main" xmlns="" val="10001"/>
                   </a:ext>
                 </a:extLst>
               </a:tr>
@@ -14765,14 +14775,14 @@
                 <a:gridCol w="2702014">
                   <a:extLst>
                     <a:ext uri="{9D8B030D-6E8A-4147-A177-3AD203B41FA5}">
-                      <a16:colId xmlns:a16="http://schemas.microsoft.com/office/drawing/2014/main" val="20000"/>
+                      <a16:colId xmlns:a16="http://schemas.microsoft.com/office/drawing/2014/main" xmlns="" val="20000"/>
                     </a:ext>
                   </a:extLst>
                 </a:gridCol>
                 <a:gridCol w="6095637">
                   <a:extLst>
                     <a:ext uri="{9D8B030D-6E8A-4147-A177-3AD203B41FA5}">
-                      <a16:colId xmlns:a16="http://schemas.microsoft.com/office/drawing/2014/main" val="20001"/>
+                      <a16:colId xmlns:a16="http://schemas.microsoft.com/office/drawing/2014/main" xmlns="" val="20001"/>
                     </a:ext>
                   </a:extLst>
                 </a:gridCol>
@@ -14820,7 +14830,7 @@
                 </a:tc>
                 <a:extLst>
                   <a:ext uri="{0D108BD9-81ED-4DB2-BD59-A6C34878D82A}">
-                    <a16:rowId xmlns:a16="http://schemas.microsoft.com/office/drawing/2014/main" val="10000"/>
+                    <a16:rowId xmlns:a16="http://schemas.microsoft.com/office/drawing/2014/main" xmlns="" val="10000"/>
                   </a:ext>
                 </a:extLst>
               </a:tr>
@@ -14863,7 +14873,7 @@
                 </a:tc>
                 <a:extLst>
                   <a:ext uri="{0D108BD9-81ED-4DB2-BD59-A6C34878D82A}">
-                    <a16:rowId xmlns:a16="http://schemas.microsoft.com/office/drawing/2014/main" val="10001"/>
+                    <a16:rowId xmlns:a16="http://schemas.microsoft.com/office/drawing/2014/main" xmlns="" val="10001"/>
                   </a:ext>
                 </a:extLst>
               </a:tr>
@@ -14914,7 +14924,7 @@
                 </a:tc>
                 <a:extLst>
                   <a:ext uri="{0D108BD9-81ED-4DB2-BD59-A6C34878D82A}">
-                    <a16:rowId xmlns:a16="http://schemas.microsoft.com/office/drawing/2014/main" val="10002"/>
+                    <a16:rowId xmlns:a16="http://schemas.microsoft.com/office/drawing/2014/main" xmlns="" val="10002"/>
                   </a:ext>
                 </a:extLst>
               </a:tr>
@@ -14949,7 +14959,7 @@
                 </a:tc>
                 <a:extLst>
                   <a:ext uri="{0D108BD9-81ED-4DB2-BD59-A6C34878D82A}">
-                    <a16:rowId xmlns:a16="http://schemas.microsoft.com/office/drawing/2014/main" val="10003"/>
+                    <a16:rowId xmlns:a16="http://schemas.microsoft.com/office/drawing/2014/main" xmlns="" val="10003"/>
                   </a:ext>
                 </a:extLst>
               </a:tr>
@@ -15000,7 +15010,7 @@
                 </a:tc>
                 <a:extLst>
                   <a:ext uri="{0D108BD9-81ED-4DB2-BD59-A6C34878D82A}">
-                    <a16:rowId xmlns:a16="http://schemas.microsoft.com/office/drawing/2014/main" val="10004"/>
+                    <a16:rowId xmlns:a16="http://schemas.microsoft.com/office/drawing/2014/main" xmlns="" val="10004"/>
                   </a:ext>
                 </a:extLst>
               </a:tr>
@@ -15568,8 +15578,13 @@
           <a:p>
             <a:r>
               <a:rPr lang="en-SG" dirty="0" smtClean="0"/>
-              <a:t>Arduino IDE 1.6.7</a:t>
-            </a:r>
+              <a:t>Arduino IDE </a:t>
+            </a:r>
+            <a:r>
+              <a:rPr lang="en-SG" dirty="0" smtClean="0"/>
+              <a:t>1.6.9</a:t>
+            </a:r>
+            <a:endParaRPr lang="en-SG" dirty="0" smtClean="0"/>
           </a:p>
           <a:p>
             <a:r>
@@ -16285,14 +16300,24 @@
             <a:pPr lvl="1"/>
             <a:r>
               <a:rPr lang="en-SG" dirty="0" smtClean="0"/>
-              <a:t>OS: iOS 9.2.1</a:t>
-            </a:r>
-          </a:p>
-          <a:p>
-            <a:r>
-              <a:rPr lang="en-SG" dirty="0" smtClean="0"/>
-              <a:t>Programming Language: Swift 2</a:t>
-            </a:r>
+              <a:t>OS: iOS </a:t>
+            </a:r>
+            <a:r>
+              <a:rPr lang="en-SG" dirty="0" smtClean="0"/>
+              <a:t>9.3.2</a:t>
+            </a:r>
+            <a:endParaRPr lang="en-SG" dirty="0" smtClean="0"/>
+          </a:p>
+          <a:p>
+            <a:r>
+              <a:rPr lang="en-SG" dirty="0" smtClean="0"/>
+              <a:t>Programming Language: </a:t>
+            </a:r>
+            <a:r>
+              <a:rPr lang="en-SG" dirty="0" smtClean="0"/>
+              <a:t>Swift</a:t>
+            </a:r>
+            <a:endParaRPr lang="en-SG" dirty="0" smtClean="0"/>
           </a:p>
           <a:p>
             <a:r>
@@ -16301,8 +16326,13 @@
             </a:r>
             <a:r>
               <a:rPr lang="en-SG" dirty="0" smtClean="0"/>
-              <a:t> 7.2.1</a:t>
-            </a:r>
+              <a:t> </a:t>
+            </a:r>
+            <a:r>
+              <a:rPr lang="en-SG" dirty="0" smtClean="0"/>
+              <a:t>7.3.1</a:t>
+            </a:r>
+            <a:endParaRPr lang="en-SG" dirty="0" smtClean="0"/>
           </a:p>
           <a:p>
             <a:endParaRPr lang="en-SG" dirty="0"/>
@@ -22656,49 +22686,49 @@
                 <a:gridCol w="1126671">
                   <a:extLst>
                     <a:ext uri="{9D8B030D-6E8A-4147-A177-3AD203B41FA5}">
-                      <a16:colId xmlns:a16="http://schemas.microsoft.com/office/drawing/2014/main" val="20000"/>
+                      <a16:colId xmlns:a16="http://schemas.microsoft.com/office/drawing/2014/main" xmlns="" val="20000"/>
                     </a:ext>
                   </a:extLst>
                 </a:gridCol>
                 <a:gridCol w="1091118">
                   <a:extLst>
                     <a:ext uri="{9D8B030D-6E8A-4147-A177-3AD203B41FA5}">
-                      <a16:colId xmlns:a16="http://schemas.microsoft.com/office/drawing/2014/main" val="20001"/>
+                      <a16:colId xmlns:a16="http://schemas.microsoft.com/office/drawing/2014/main" xmlns="" val="20001"/>
                     </a:ext>
                   </a:extLst>
                 </a:gridCol>
                 <a:gridCol w="1423219">
                   <a:extLst>
                     <a:ext uri="{9D8B030D-6E8A-4147-A177-3AD203B41FA5}">
-                      <a16:colId xmlns:a16="http://schemas.microsoft.com/office/drawing/2014/main" val="20002"/>
+                      <a16:colId xmlns:a16="http://schemas.microsoft.com/office/drawing/2014/main" xmlns="" val="20002"/>
                     </a:ext>
                   </a:extLst>
                 </a:gridCol>
                 <a:gridCol w="671052">
                   <a:extLst>
                     <a:ext uri="{9D8B030D-6E8A-4147-A177-3AD203B41FA5}">
-                      <a16:colId xmlns:a16="http://schemas.microsoft.com/office/drawing/2014/main" val="20003"/>
+                      <a16:colId xmlns:a16="http://schemas.microsoft.com/office/drawing/2014/main" xmlns="" val="20003"/>
                     </a:ext>
                   </a:extLst>
                 </a:gridCol>
                 <a:gridCol w="648929">
                   <a:extLst>
                     <a:ext uri="{9D8B030D-6E8A-4147-A177-3AD203B41FA5}">
-                      <a16:colId xmlns:a16="http://schemas.microsoft.com/office/drawing/2014/main" val="20004"/>
+                      <a16:colId xmlns:a16="http://schemas.microsoft.com/office/drawing/2014/main" xmlns="" val="20004"/>
                     </a:ext>
                   </a:extLst>
                 </a:gridCol>
                 <a:gridCol w="1939413">
                   <a:extLst>
                     <a:ext uri="{9D8B030D-6E8A-4147-A177-3AD203B41FA5}">
-                      <a16:colId xmlns:a16="http://schemas.microsoft.com/office/drawing/2014/main" val="20005"/>
+                      <a16:colId xmlns:a16="http://schemas.microsoft.com/office/drawing/2014/main" xmlns="" val="20005"/>
                     </a:ext>
                   </a:extLst>
                 </a:gridCol>
                 <a:gridCol w="986295">
                   <a:extLst>
                     <a:ext uri="{9D8B030D-6E8A-4147-A177-3AD203B41FA5}">
-                      <a16:colId xmlns:a16="http://schemas.microsoft.com/office/drawing/2014/main" val="20006"/>
+                      <a16:colId xmlns:a16="http://schemas.microsoft.com/office/drawing/2014/main" xmlns="" val="20006"/>
                     </a:ext>
                   </a:extLst>
                 </a:gridCol>
@@ -22812,7 +22842,7 @@
                 </a:tc>
                 <a:extLst>
                   <a:ext uri="{0D108BD9-81ED-4DB2-BD59-A6C34878D82A}">
-                    <a16:rowId xmlns:a16="http://schemas.microsoft.com/office/drawing/2014/main" val="10000"/>
+                    <a16:rowId xmlns:a16="http://schemas.microsoft.com/office/drawing/2014/main" xmlns="" val="10000"/>
                   </a:ext>
                 </a:extLst>
               </a:tr>
@@ -22950,7 +22980,7 @@
                 </a:tc>
                 <a:extLst>
                   <a:ext uri="{0D108BD9-81ED-4DB2-BD59-A6C34878D82A}">
-                    <a16:rowId xmlns:a16="http://schemas.microsoft.com/office/drawing/2014/main" val="10001"/>
+                    <a16:rowId xmlns:a16="http://schemas.microsoft.com/office/drawing/2014/main" xmlns="" val="10001"/>
                   </a:ext>
                 </a:extLst>
               </a:tr>

</xml_diff>